<commit_message>
working on primary care dataset
</commit_message>
<xml_diff>
--- a/artifacts/Comments on model.pptx
+++ b/artifacts/Comments on model.pptx
@@ -9,14 +9,14 @@
     <p:sldId id="265" r:id="rId3"/>
     <p:sldId id="264" r:id="rId4"/>
     <p:sldId id="258" r:id="rId5"/>
-    <p:sldId id="257" r:id="rId6"/>
-    <p:sldId id="260" r:id="rId7"/>
-    <p:sldId id="261" r:id="rId8"/>
-    <p:sldId id="262" r:id="rId9"/>
-    <p:sldId id="263" r:id="rId10"/>
-    <p:sldId id="266" r:id="rId11"/>
-    <p:sldId id="267" r:id="rId12"/>
-    <p:sldId id="259" r:id="rId13"/>
+    <p:sldId id="268" r:id="rId6"/>
+    <p:sldId id="269" r:id="rId7"/>
+    <p:sldId id="257" r:id="rId8"/>
+    <p:sldId id="260" r:id="rId9"/>
+    <p:sldId id="261" r:id="rId10"/>
+    <p:sldId id="262" r:id="rId11"/>
+    <p:sldId id="263" r:id="rId12"/>
+    <p:sldId id="266" r:id="rId13"/>
   </p:sldIdLst>
   <p:sldSz cx="12192000" cy="6858000"/>
   <p:notesSz cx="6858000" cy="9144000"/>
@@ -115,6 +115,11 @@
       </a:defRPr>
     </a:lvl9pPr>
   </p:defaultTextStyle>
+  <p:extLst>
+    <p:ext uri="{EFAFB233-063F-42B5-8137-9DF3F51BA10A}">
+      <p15:sldGuideLst xmlns:p15="http://schemas.microsoft.com/office/powerpoint/2012/main"/>
+    </p:ext>
+  </p:extLst>
 </p:presentation>
 </file>
 
@@ -265,7 +270,7 @@
           <a:p>
             <a:fld id="{025A6349-1180-8E49-8015-842960DB986F}" type="datetimeFigureOut">
               <a:rPr lang="en-US" smtClean="0"/>
-              <a:t>1/24/19</a:t>
+              <a:t>2/1/19</a:t>
             </a:fld>
             <a:endParaRPr lang="en-US"/>
           </a:p>
@@ -463,7 +468,7 @@
           <a:p>
             <a:fld id="{025A6349-1180-8E49-8015-842960DB986F}" type="datetimeFigureOut">
               <a:rPr lang="en-US" smtClean="0"/>
-              <a:t>1/24/19</a:t>
+              <a:t>2/1/19</a:t>
             </a:fld>
             <a:endParaRPr lang="en-US"/>
           </a:p>
@@ -671,7 +676,7 @@
           <a:p>
             <a:fld id="{025A6349-1180-8E49-8015-842960DB986F}" type="datetimeFigureOut">
               <a:rPr lang="en-US" smtClean="0"/>
-              <a:t>1/24/19</a:t>
+              <a:t>2/1/19</a:t>
             </a:fld>
             <a:endParaRPr lang="en-US"/>
           </a:p>
@@ -869,7 +874,7 @@
           <a:p>
             <a:fld id="{025A6349-1180-8E49-8015-842960DB986F}" type="datetimeFigureOut">
               <a:rPr lang="en-US" smtClean="0"/>
-              <a:t>1/24/19</a:t>
+              <a:t>2/1/19</a:t>
             </a:fld>
             <a:endParaRPr lang="en-US"/>
           </a:p>
@@ -1144,7 +1149,7 @@
           <a:p>
             <a:fld id="{025A6349-1180-8E49-8015-842960DB986F}" type="datetimeFigureOut">
               <a:rPr lang="en-US" smtClean="0"/>
-              <a:t>1/24/19</a:t>
+              <a:t>2/1/19</a:t>
             </a:fld>
             <a:endParaRPr lang="en-US"/>
           </a:p>
@@ -1409,7 +1414,7 @@
           <a:p>
             <a:fld id="{025A6349-1180-8E49-8015-842960DB986F}" type="datetimeFigureOut">
               <a:rPr lang="en-US" smtClean="0"/>
-              <a:t>1/24/19</a:t>
+              <a:t>2/1/19</a:t>
             </a:fld>
             <a:endParaRPr lang="en-US"/>
           </a:p>
@@ -1821,7 +1826,7 @@
           <a:p>
             <a:fld id="{025A6349-1180-8E49-8015-842960DB986F}" type="datetimeFigureOut">
               <a:rPr lang="en-US" smtClean="0"/>
-              <a:t>1/24/19</a:t>
+              <a:t>2/1/19</a:t>
             </a:fld>
             <a:endParaRPr lang="en-US"/>
           </a:p>
@@ -1962,7 +1967,7 @@
           <a:p>
             <a:fld id="{025A6349-1180-8E49-8015-842960DB986F}" type="datetimeFigureOut">
               <a:rPr lang="en-US" smtClean="0"/>
-              <a:t>1/24/19</a:t>
+              <a:t>2/1/19</a:t>
             </a:fld>
             <a:endParaRPr lang="en-US"/>
           </a:p>
@@ -2075,7 +2080,7 @@
           <a:p>
             <a:fld id="{025A6349-1180-8E49-8015-842960DB986F}" type="datetimeFigureOut">
               <a:rPr lang="en-US" smtClean="0"/>
-              <a:t>1/24/19</a:t>
+              <a:t>2/1/19</a:t>
             </a:fld>
             <a:endParaRPr lang="en-US"/>
           </a:p>
@@ -2386,7 +2391,7 @@
           <a:p>
             <a:fld id="{025A6349-1180-8E49-8015-842960DB986F}" type="datetimeFigureOut">
               <a:rPr lang="en-US" smtClean="0"/>
-              <a:t>1/24/19</a:t>
+              <a:t>2/1/19</a:t>
             </a:fld>
             <a:endParaRPr lang="en-US"/>
           </a:p>
@@ -2674,7 +2679,7 @@
           <a:p>
             <a:fld id="{025A6349-1180-8E49-8015-842960DB986F}" type="datetimeFigureOut">
               <a:rPr lang="en-US" smtClean="0"/>
-              <a:t>1/24/19</a:t>
+              <a:t>2/1/19</a:t>
             </a:fld>
             <a:endParaRPr lang="en-US"/>
           </a:p>
@@ -2915,7 +2920,7 @@
           <a:p>
             <a:fld id="{025A6349-1180-8E49-8015-842960DB986F}" type="datetimeFigureOut">
               <a:rPr lang="en-US" smtClean="0"/>
-              <a:t>1/24/19</a:t>
+              <a:t>2/1/19</a:t>
             </a:fld>
             <a:endParaRPr lang="en-US"/>
           </a:p>
@@ -3423,7 +3428,7 @@
           <p:cNvPr id="2" name="Title 1">
             <a:extLst>
               <a:ext uri="{FF2B5EF4-FFF2-40B4-BE49-F238E27FC236}">
-                <a16:creationId xmlns:a16="http://schemas.microsoft.com/office/drawing/2014/main" id="{05C72050-D6C4-764E-97A5-221C9731AA25}"/>
+                <a16:creationId xmlns:a16="http://schemas.microsoft.com/office/drawing/2014/main" id="{D7DEC8A6-F787-FB43-A6E7-D9B4B97973B3}"/>
               </a:ext>
             </a:extLst>
           </p:cNvPr>
@@ -3437,7 +3442,7 @@
         <p:spPr>
           <a:xfrm>
             <a:off x="838200" y="365125"/>
-            <a:ext cx="6205151" cy="1325563"/>
+            <a:ext cx="4672914" cy="1325563"/>
           </a:xfrm>
         </p:spPr>
         <p:txBody>
@@ -3446,7 +3451,7 @@
           <a:p>
             <a:r>
               <a:rPr lang="en-US" dirty="0"/>
-              <a:t>All comments for model</a:t>
+              <a:t>Comments</a:t>
             </a:r>
           </a:p>
         </p:txBody>
@@ -3456,7 +3461,7 @@
           <p:cNvPr id="4" name="Picture 3">
             <a:extLst>
               <a:ext uri="{FF2B5EF4-FFF2-40B4-BE49-F238E27FC236}">
-                <a16:creationId xmlns:a16="http://schemas.microsoft.com/office/drawing/2014/main" id="{683789C1-DAD7-8043-9CB9-CC9BB7A7706A}"/>
+                <a16:creationId xmlns:a16="http://schemas.microsoft.com/office/drawing/2014/main" id="{839C2C5B-B33C-D148-A78A-2F8B1ACDE079}"/>
               </a:ext>
             </a:extLst>
           </p:cNvPr>
@@ -3473,8 +3478,8 @@
         </p:blipFill>
         <p:spPr>
           <a:xfrm>
-            <a:off x="0" y="1838414"/>
-            <a:ext cx="12192000" cy="4808420"/>
+            <a:off x="0" y="1523894"/>
+            <a:ext cx="12192000" cy="4675183"/>
           </a:xfrm>
           <a:prstGeom prst="rect">
             <a:avLst/>
@@ -3483,10 +3488,93 @@
       </p:pic>
       <p:sp>
         <p:nvSpPr>
-          <p:cNvPr id="5" name="Oval 4">
-            <a:extLst>
-              <a:ext uri="{FF2B5EF4-FFF2-40B4-BE49-F238E27FC236}">
-                <a16:creationId xmlns:a16="http://schemas.microsoft.com/office/drawing/2014/main" id="{66B41ABF-7F01-0D4D-BCE9-CA4A7BAE31FA}"/>
+          <p:cNvPr id="5" name="TextBox 4">
+            <a:extLst>
+              <a:ext uri="{FF2B5EF4-FFF2-40B4-BE49-F238E27FC236}">
+                <a16:creationId xmlns:a16="http://schemas.microsoft.com/office/drawing/2014/main" id="{3289B97E-7B98-144C-919B-6FE7EBCDF5AF}"/>
+              </a:ext>
+            </a:extLst>
+          </p:cNvPr>
+          <p:cNvSpPr txBox="1"/>
+          <p:nvPr/>
+        </p:nvSpPr>
+        <p:spPr>
+          <a:xfrm>
+            <a:off x="3645243" y="2990336"/>
+            <a:ext cx="2130327" cy="646331"/>
+          </a:xfrm>
+          <a:prstGeom prst="rect">
+            <a:avLst/>
+          </a:prstGeom>
+          <a:noFill/>
+        </p:spPr>
+        <p:txBody>
+          <a:bodyPr wrap="none" rtlCol="0">
+            <a:spAutoFit/>
+          </a:bodyPr>
+          <a:lstStyle/>
+          <a:p>
+            <a:r>
+              <a:rPr lang="en-US" dirty="0"/>
+              <a:t>Add a new comment</a:t>
+            </a:r>
+          </a:p>
+          <a:p>
+            <a:r>
+              <a:rPr lang="en-US" dirty="0"/>
+              <a:t>(Logged in user only)</a:t>
+            </a:r>
+          </a:p>
+        </p:txBody>
+      </p:sp>
+      <p:cxnSp>
+        <p:nvCxnSpPr>
+          <p:cNvPr id="7" name="Straight Arrow Connector 6">
+            <a:extLst>
+              <a:ext uri="{FF2B5EF4-FFF2-40B4-BE49-F238E27FC236}">
+                <a16:creationId xmlns:a16="http://schemas.microsoft.com/office/drawing/2014/main" id="{A547306F-DF55-FA49-A7E9-006CD7FA3009}"/>
+              </a:ext>
+            </a:extLst>
+          </p:cNvPr>
+          <p:cNvCxnSpPr/>
+          <p:nvPr/>
+        </p:nvCxnSpPr>
+        <p:spPr>
+          <a:xfrm>
+            <a:off x="5782962" y="3126259"/>
+            <a:ext cx="5461687" cy="1779373"/>
+          </a:xfrm>
+          <a:prstGeom prst="straightConnector1">
+            <a:avLst/>
+          </a:prstGeom>
+          <a:ln>
+            <a:solidFill>
+              <a:srgbClr val="FF0000"/>
+            </a:solidFill>
+            <a:tailEnd type="triangle"/>
+          </a:ln>
+        </p:spPr>
+        <p:style>
+          <a:lnRef idx="1">
+            <a:schemeClr val="accent1"/>
+          </a:lnRef>
+          <a:fillRef idx="0">
+            <a:schemeClr val="accent1"/>
+          </a:fillRef>
+          <a:effectRef idx="0">
+            <a:schemeClr val="accent1"/>
+          </a:effectRef>
+          <a:fontRef idx="minor">
+            <a:schemeClr val="tx1"/>
+          </a:fontRef>
+        </p:style>
+      </p:cxnSp>
+      <p:sp>
+        <p:nvSpPr>
+          <p:cNvPr id="8" name="Oval 7">
+            <a:extLst>
+              <a:ext uri="{FF2B5EF4-FFF2-40B4-BE49-F238E27FC236}">
+                <a16:creationId xmlns:a16="http://schemas.microsoft.com/office/drawing/2014/main" id="{A2640E01-7C27-C342-8BA9-F436889BF5C7}"/>
               </a:ext>
             </a:extLst>
           </p:cNvPr>
@@ -3494,9 +3582,9 @@
           <p:nvPr/>
         </p:nvSpPr>
         <p:spPr>
-          <a:xfrm flipV="1">
-            <a:off x="6880100" y="2187144"/>
-            <a:ext cx="2066191" cy="1149179"/>
+          <a:xfrm>
+            <a:off x="11244649" y="4745353"/>
+            <a:ext cx="1085335" cy="320557"/>
           </a:xfrm>
           <a:prstGeom prst="ellipse">
             <a:avLst/>
@@ -3535,10 +3623,57 @@
       </p:sp>
       <p:sp>
         <p:nvSpPr>
-          <p:cNvPr id="6" name="Oval 5">
-            <a:extLst>
-              <a:ext uri="{FF2B5EF4-FFF2-40B4-BE49-F238E27FC236}">
-                <a16:creationId xmlns:a16="http://schemas.microsoft.com/office/drawing/2014/main" id="{74C92FB2-C8C0-A44D-87C8-C08160AC2548}"/>
+          <p:cNvPr id="9" name="TextBox 8">
+            <a:extLst>
+              <a:ext uri="{FF2B5EF4-FFF2-40B4-BE49-F238E27FC236}">
+                <a16:creationId xmlns:a16="http://schemas.microsoft.com/office/drawing/2014/main" id="{C60B4ADD-DD40-2445-B9F6-897D3D88CEAA}"/>
+              </a:ext>
+            </a:extLst>
+          </p:cNvPr>
+          <p:cNvSpPr txBox="1"/>
+          <p:nvPr/>
+        </p:nvSpPr>
+        <p:spPr>
+          <a:xfrm>
+            <a:off x="3113904" y="5229189"/>
+            <a:ext cx="3211986" cy="923330"/>
+          </a:xfrm>
+          <a:prstGeom prst="rect">
+            <a:avLst/>
+          </a:prstGeom>
+          <a:noFill/>
+        </p:spPr>
+        <p:txBody>
+          <a:bodyPr wrap="square" rtlCol="0">
+            <a:spAutoFit/>
+          </a:bodyPr>
+          <a:lstStyle/>
+          <a:p>
+            <a:r>
+              <a:rPr lang="en-US" dirty="0"/>
+              <a:t>Edit comment</a:t>
+            </a:r>
+          </a:p>
+          <a:p>
+            <a:r>
+              <a:rPr lang="en-US" dirty="0"/>
+              <a:t>(Anyone can view) </a:t>
+            </a:r>
+          </a:p>
+          <a:p>
+            <a:r>
+              <a:rPr lang="en-US" dirty="0"/>
+              <a:t>Add a note – logged in user</a:t>
+            </a:r>
+          </a:p>
+        </p:txBody>
+      </p:sp>
+      <p:sp>
+        <p:nvSpPr>
+          <p:cNvPr id="10" name="Oval 9">
+            <a:extLst>
+              <a:ext uri="{FF2B5EF4-FFF2-40B4-BE49-F238E27FC236}">
+                <a16:creationId xmlns:a16="http://schemas.microsoft.com/office/drawing/2014/main" id="{EDA89960-36FD-F146-A556-CE06651ABA62}"/>
               </a:ext>
             </a:extLst>
           </p:cNvPr>
@@ -3546,9 +3681,9 @@
           <p:nvPr/>
         </p:nvSpPr>
         <p:spPr>
-          <a:xfrm flipV="1">
-            <a:off x="11578280" y="3941805"/>
-            <a:ext cx="613719" cy="355172"/>
+          <a:xfrm>
+            <a:off x="11615351" y="5065910"/>
+            <a:ext cx="615778" cy="308201"/>
           </a:xfrm>
           <a:prstGeom prst="ellipse">
             <a:avLst/>
@@ -3585,61 +3720,22 @@
           </a:p>
         </p:txBody>
       </p:sp>
-      <p:sp>
-        <p:nvSpPr>
-          <p:cNvPr id="7" name="TextBox 6">
-            <a:extLst>
-              <a:ext uri="{FF2B5EF4-FFF2-40B4-BE49-F238E27FC236}">
-                <a16:creationId xmlns:a16="http://schemas.microsoft.com/office/drawing/2014/main" id="{B5AA931F-B1F8-A048-870E-347B4DF61184}"/>
-              </a:ext>
-            </a:extLst>
-          </p:cNvPr>
-          <p:cNvSpPr txBox="1"/>
-          <p:nvPr/>
-        </p:nvSpPr>
-        <p:spPr>
-          <a:xfrm>
-            <a:off x="7414054" y="1173892"/>
-            <a:ext cx="1707070" cy="369332"/>
-          </a:xfrm>
-          <a:prstGeom prst="rect">
-            <a:avLst/>
-          </a:prstGeom>
-          <a:noFill/>
-        </p:spPr>
-        <p:txBody>
-          <a:bodyPr wrap="none" rtlCol="0">
-            <a:spAutoFit/>
-          </a:bodyPr>
-          <a:lstStyle/>
-          <a:p>
-            <a:r>
-              <a:rPr lang="en-US" dirty="0"/>
-              <a:t>View / Add note</a:t>
-            </a:r>
-          </a:p>
-        </p:txBody>
-      </p:sp>
       <p:cxnSp>
         <p:nvCxnSpPr>
-          <p:cNvPr id="9" name="Straight Arrow Connector 8">
-            <a:extLst>
-              <a:ext uri="{FF2B5EF4-FFF2-40B4-BE49-F238E27FC236}">
-                <a16:creationId xmlns:a16="http://schemas.microsoft.com/office/drawing/2014/main" id="{9A9552F5-337D-3345-8274-6ACC347C69AA}"/>
-              </a:ext>
-            </a:extLst>
-          </p:cNvPr>
-          <p:cNvCxnSpPr>
-            <a:cxnSpLocks/>
-            <a:stCxn id="7" idx="2"/>
-            <a:endCxn id="6" idx="3"/>
-          </p:cNvCxnSpPr>
+          <p:cNvPr id="12" name="Straight Arrow Connector 11">
+            <a:extLst>
+              <a:ext uri="{FF2B5EF4-FFF2-40B4-BE49-F238E27FC236}">
+                <a16:creationId xmlns:a16="http://schemas.microsoft.com/office/drawing/2014/main" id="{1BD22FB9-C266-1F4E-A4F1-36C0A2CD2071}"/>
+              </a:ext>
+            </a:extLst>
+          </p:cNvPr>
+          <p:cNvCxnSpPr/>
           <p:nvPr/>
         </p:nvCxnSpPr>
         <p:spPr>
-          <a:xfrm>
-            <a:off x="8267589" y="1543224"/>
-            <a:ext cx="3400568" cy="2450595"/>
+          <a:xfrm flipV="1">
+            <a:off x="5985475" y="5229189"/>
+            <a:ext cx="5654590" cy="318995"/>
           </a:xfrm>
           <a:prstGeom prst="straightConnector1">
             <a:avLst/>
@@ -3669,7 +3765,7 @@
     </p:spTree>
     <p:extLst>
       <p:ext uri="{BB962C8B-B14F-4D97-AF65-F5344CB8AC3E}">
-        <p14:creationId xmlns:p14="http://schemas.microsoft.com/office/powerpoint/2010/main" val="937182911"/>
+        <p14:creationId xmlns:p14="http://schemas.microsoft.com/office/powerpoint/2010/main" val="1545622574"/>
       </p:ext>
     </p:extLst>
   </p:cSld>
@@ -3701,7 +3797,7 @@
           <p:cNvPr id="2" name="Title 1">
             <a:extLst>
               <a:ext uri="{FF2B5EF4-FFF2-40B4-BE49-F238E27FC236}">
-                <a16:creationId xmlns:a16="http://schemas.microsoft.com/office/drawing/2014/main" id="{E12E6E41-E357-5D49-9FB7-024464AD3F3F}"/>
+                <a16:creationId xmlns:a16="http://schemas.microsoft.com/office/drawing/2014/main" id="{B012B7B1-A870-5C40-B2E6-8992756D3752}"/>
               </a:ext>
             </a:extLst>
           </p:cNvPr>
@@ -3719,15 +3815,448 @@
           <a:p>
             <a:r>
               <a:rPr lang="en-US" dirty="0"/>
-              <a:t>Task Manager</a:t>
-            </a:r>
-          </a:p>
-        </p:txBody>
-      </p:sp>
+              <a:t>Comment details and notes</a:t>
+            </a:r>
+          </a:p>
+        </p:txBody>
+      </p:sp>
+      <p:pic>
+        <p:nvPicPr>
+          <p:cNvPr id="4" name="Picture 3">
+            <a:extLst>
+              <a:ext uri="{FF2B5EF4-FFF2-40B4-BE49-F238E27FC236}">
+                <a16:creationId xmlns:a16="http://schemas.microsoft.com/office/drawing/2014/main" id="{C944E600-9756-9044-80FF-47700D35B668}"/>
+              </a:ext>
+            </a:extLst>
+          </p:cNvPr>
+          <p:cNvPicPr>
+            <a:picLocks noChangeAspect="1"/>
+          </p:cNvPicPr>
+          <p:nvPr/>
+        </p:nvPicPr>
+        <p:blipFill>
+          <a:blip r:embed="rId2"/>
+          <a:stretch>
+            <a:fillRect/>
+          </a:stretch>
+        </p:blipFill>
+        <p:spPr>
+          <a:xfrm>
+            <a:off x="838200" y="1690688"/>
+            <a:ext cx="10299700" cy="4838700"/>
+          </a:xfrm>
+          <a:prstGeom prst="rect">
+            <a:avLst/>
+          </a:prstGeom>
+        </p:spPr>
+      </p:pic>
+      <p:sp>
+        <p:nvSpPr>
+          <p:cNvPr id="5" name="Oval 4">
+            <a:extLst>
+              <a:ext uri="{FF2B5EF4-FFF2-40B4-BE49-F238E27FC236}">
+                <a16:creationId xmlns:a16="http://schemas.microsoft.com/office/drawing/2014/main" id="{773CAB60-7A1F-A34D-9D2D-BBFEFFBC26A6}"/>
+              </a:ext>
+            </a:extLst>
+          </p:cNvPr>
+          <p:cNvSpPr/>
+          <p:nvPr/>
+        </p:nvSpPr>
+        <p:spPr>
+          <a:xfrm flipV="1">
+            <a:off x="392802" y="2542585"/>
+            <a:ext cx="3215371" cy="2573112"/>
+          </a:xfrm>
+          <a:prstGeom prst="ellipse">
+            <a:avLst/>
+          </a:prstGeom>
+          <a:noFill/>
+          <a:ln>
+            <a:solidFill>
+              <a:srgbClr val="FF0000"/>
+            </a:solidFill>
+          </a:ln>
+        </p:spPr>
+        <p:style>
+          <a:lnRef idx="2">
+            <a:schemeClr val="accent1">
+              <a:shade val="50000"/>
+            </a:schemeClr>
+          </a:lnRef>
+          <a:fillRef idx="1">
+            <a:schemeClr val="accent1"/>
+          </a:fillRef>
+          <a:effectRef idx="0">
+            <a:schemeClr val="accent1"/>
+          </a:effectRef>
+          <a:fontRef idx="minor">
+            <a:schemeClr val="lt1"/>
+          </a:fontRef>
+        </p:style>
+        <p:txBody>
+          <a:bodyPr rtlCol="0" anchor="ctr"/>
+          <a:lstStyle/>
+          <a:p>
+            <a:pPr algn="ctr"/>
+            <a:endParaRPr lang="en-US"/>
+          </a:p>
+        </p:txBody>
+      </p:sp>
+      <p:sp>
+        <p:nvSpPr>
+          <p:cNvPr id="6" name="Oval 5">
+            <a:extLst>
+              <a:ext uri="{FF2B5EF4-FFF2-40B4-BE49-F238E27FC236}">
+                <a16:creationId xmlns:a16="http://schemas.microsoft.com/office/drawing/2014/main" id="{811D4C7F-53B7-F14D-B25C-44CC23211E93}"/>
+              </a:ext>
+            </a:extLst>
+          </p:cNvPr>
+          <p:cNvSpPr/>
+          <p:nvPr/>
+        </p:nvSpPr>
+        <p:spPr>
+          <a:xfrm>
+            <a:off x="4198683" y="3176592"/>
+            <a:ext cx="6415771" cy="1097965"/>
+          </a:xfrm>
+          <a:prstGeom prst="ellipse">
+            <a:avLst/>
+          </a:prstGeom>
+          <a:noFill/>
+          <a:ln>
+            <a:solidFill>
+              <a:srgbClr val="FF0000"/>
+            </a:solidFill>
+          </a:ln>
+        </p:spPr>
+        <p:style>
+          <a:lnRef idx="2">
+            <a:schemeClr val="accent1">
+              <a:shade val="50000"/>
+            </a:schemeClr>
+          </a:lnRef>
+          <a:fillRef idx="1">
+            <a:schemeClr val="accent1"/>
+          </a:fillRef>
+          <a:effectRef idx="0">
+            <a:schemeClr val="accent1"/>
+          </a:effectRef>
+          <a:fontRef idx="minor">
+            <a:schemeClr val="lt1"/>
+          </a:fontRef>
+        </p:style>
+        <p:txBody>
+          <a:bodyPr rtlCol="0" anchor="ctr"/>
+          <a:lstStyle/>
+          <a:p>
+            <a:pPr algn="ctr"/>
+            <a:endParaRPr lang="en-US"/>
+          </a:p>
+        </p:txBody>
+      </p:sp>
+      <p:sp>
+        <p:nvSpPr>
+          <p:cNvPr id="7" name="Oval 6">
+            <a:extLst>
+              <a:ext uri="{FF2B5EF4-FFF2-40B4-BE49-F238E27FC236}">
+                <a16:creationId xmlns:a16="http://schemas.microsoft.com/office/drawing/2014/main" id="{B1F9074B-E529-8A45-AFB2-D8169716EFA7}"/>
+              </a:ext>
+            </a:extLst>
+          </p:cNvPr>
+          <p:cNvSpPr/>
+          <p:nvPr/>
+        </p:nvSpPr>
+        <p:spPr>
+          <a:xfrm>
+            <a:off x="4458985" y="4502155"/>
+            <a:ext cx="6894816" cy="1097965"/>
+          </a:xfrm>
+          <a:prstGeom prst="ellipse">
+            <a:avLst/>
+          </a:prstGeom>
+          <a:noFill/>
+          <a:ln>
+            <a:solidFill>
+              <a:srgbClr val="FF0000"/>
+            </a:solidFill>
+          </a:ln>
+        </p:spPr>
+        <p:style>
+          <a:lnRef idx="2">
+            <a:schemeClr val="accent1">
+              <a:shade val="50000"/>
+            </a:schemeClr>
+          </a:lnRef>
+          <a:fillRef idx="1">
+            <a:schemeClr val="accent1"/>
+          </a:fillRef>
+          <a:effectRef idx="0">
+            <a:schemeClr val="accent1"/>
+          </a:effectRef>
+          <a:fontRef idx="minor">
+            <a:schemeClr val="lt1"/>
+          </a:fontRef>
+        </p:style>
+        <p:txBody>
+          <a:bodyPr rtlCol="0" anchor="ctr"/>
+          <a:lstStyle/>
+          <a:p>
+            <a:pPr algn="ctr"/>
+            <a:endParaRPr lang="en-US"/>
+          </a:p>
+        </p:txBody>
+      </p:sp>
+      <p:sp>
+        <p:nvSpPr>
+          <p:cNvPr id="8" name="TextBox 7">
+            <a:extLst>
+              <a:ext uri="{FF2B5EF4-FFF2-40B4-BE49-F238E27FC236}">
+                <a16:creationId xmlns:a16="http://schemas.microsoft.com/office/drawing/2014/main" id="{EB1E2E4D-DE7C-5448-94F2-DEE9D37F5DE2}"/>
+              </a:ext>
+            </a:extLst>
+          </p:cNvPr>
+          <p:cNvSpPr txBox="1"/>
+          <p:nvPr/>
+        </p:nvSpPr>
+        <p:spPr>
+          <a:xfrm>
+            <a:off x="5474043" y="1690688"/>
+            <a:ext cx="2018438" cy="369332"/>
+          </a:xfrm>
+          <a:prstGeom prst="rect">
+            <a:avLst/>
+          </a:prstGeom>
+          <a:noFill/>
+        </p:spPr>
+        <p:txBody>
+          <a:bodyPr wrap="none" rtlCol="0">
+            <a:spAutoFit/>
+          </a:bodyPr>
+          <a:lstStyle/>
+          <a:p>
+            <a:r>
+              <a:rPr lang="en-US" dirty="0"/>
+              <a:t>Details of comment</a:t>
+            </a:r>
+          </a:p>
+        </p:txBody>
+      </p:sp>
+      <p:cxnSp>
+        <p:nvCxnSpPr>
+          <p:cNvPr id="10" name="Straight Arrow Connector 9">
+            <a:extLst>
+              <a:ext uri="{FF2B5EF4-FFF2-40B4-BE49-F238E27FC236}">
+                <a16:creationId xmlns:a16="http://schemas.microsoft.com/office/drawing/2014/main" id="{F0C0DF53-CBE7-244C-A410-E2ED85371A7D}"/>
+              </a:ext>
+            </a:extLst>
+          </p:cNvPr>
+          <p:cNvCxnSpPr>
+            <a:stCxn id="8" idx="1"/>
+          </p:cNvCxnSpPr>
+          <p:nvPr/>
+        </p:nvCxnSpPr>
+        <p:spPr>
+          <a:xfrm flipH="1">
+            <a:off x="3398108" y="1875354"/>
+            <a:ext cx="2075935" cy="1301238"/>
+          </a:xfrm>
+          <a:prstGeom prst="straightConnector1">
+            <a:avLst/>
+          </a:prstGeom>
+          <a:ln>
+            <a:solidFill>
+              <a:srgbClr val="FF0000"/>
+            </a:solidFill>
+            <a:tailEnd type="triangle"/>
+          </a:ln>
+        </p:spPr>
+        <p:style>
+          <a:lnRef idx="1">
+            <a:schemeClr val="accent1"/>
+          </a:lnRef>
+          <a:fillRef idx="0">
+            <a:schemeClr val="accent1"/>
+          </a:fillRef>
+          <a:effectRef idx="0">
+            <a:schemeClr val="accent1"/>
+          </a:effectRef>
+          <a:fontRef idx="minor">
+            <a:schemeClr val="tx1"/>
+          </a:fontRef>
+        </p:style>
+      </p:cxnSp>
+      <p:sp>
+        <p:nvSpPr>
+          <p:cNvPr id="11" name="TextBox 10">
+            <a:extLst>
+              <a:ext uri="{FF2B5EF4-FFF2-40B4-BE49-F238E27FC236}">
+                <a16:creationId xmlns:a16="http://schemas.microsoft.com/office/drawing/2014/main" id="{AC501962-3193-414C-BA1B-3AC656A5AFA2}"/>
+              </a:ext>
+            </a:extLst>
+          </p:cNvPr>
+          <p:cNvSpPr txBox="1"/>
+          <p:nvPr/>
+        </p:nvSpPr>
+        <p:spPr>
+          <a:xfrm>
+            <a:off x="8773297" y="1128894"/>
+            <a:ext cx="2842958" cy="369332"/>
+          </a:xfrm>
+          <a:prstGeom prst="rect">
+            <a:avLst/>
+          </a:prstGeom>
+          <a:noFill/>
+        </p:spPr>
+        <p:txBody>
+          <a:bodyPr wrap="none" rtlCol="0">
+            <a:spAutoFit/>
+          </a:bodyPr>
+          <a:lstStyle/>
+          <a:p>
+            <a:r>
+              <a:rPr lang="en-US" dirty="0"/>
+              <a:t>Notes that have been added</a:t>
+            </a:r>
+          </a:p>
+        </p:txBody>
+      </p:sp>
+      <p:cxnSp>
+        <p:nvCxnSpPr>
+          <p:cNvPr id="13" name="Straight Arrow Connector 12">
+            <a:extLst>
+              <a:ext uri="{FF2B5EF4-FFF2-40B4-BE49-F238E27FC236}">
+                <a16:creationId xmlns:a16="http://schemas.microsoft.com/office/drawing/2014/main" id="{3565A96F-C9BC-DF40-B965-8EDB8812FA73}"/>
+              </a:ext>
+            </a:extLst>
+          </p:cNvPr>
+          <p:cNvCxnSpPr>
+            <a:cxnSpLocks/>
+            <a:stCxn id="11" idx="2"/>
+            <a:endCxn id="6" idx="7"/>
+          </p:cNvCxnSpPr>
+          <p:nvPr/>
+        </p:nvCxnSpPr>
+        <p:spPr>
+          <a:xfrm flipH="1">
+            <a:off x="9674886" y="1498226"/>
+            <a:ext cx="519890" cy="1839159"/>
+          </a:xfrm>
+          <a:prstGeom prst="straightConnector1">
+            <a:avLst/>
+          </a:prstGeom>
+          <a:ln>
+            <a:solidFill>
+              <a:srgbClr val="FF0000"/>
+            </a:solidFill>
+            <a:tailEnd type="triangle"/>
+          </a:ln>
+        </p:spPr>
+        <p:style>
+          <a:lnRef idx="1">
+            <a:schemeClr val="accent1"/>
+          </a:lnRef>
+          <a:fillRef idx="0">
+            <a:schemeClr val="accent1"/>
+          </a:fillRef>
+          <a:effectRef idx="0">
+            <a:schemeClr val="accent1"/>
+          </a:effectRef>
+          <a:fontRef idx="minor">
+            <a:schemeClr val="tx1"/>
+          </a:fontRef>
+        </p:style>
+      </p:cxnSp>
+      <p:sp>
+        <p:nvSpPr>
+          <p:cNvPr id="14" name="TextBox 13">
+            <a:extLst>
+              <a:ext uri="{FF2B5EF4-FFF2-40B4-BE49-F238E27FC236}">
+                <a16:creationId xmlns:a16="http://schemas.microsoft.com/office/drawing/2014/main" id="{801BCA21-2383-BD4F-87F4-8D45698F338D}"/>
+              </a:ext>
+            </a:extLst>
+          </p:cNvPr>
+          <p:cNvSpPr txBox="1"/>
+          <p:nvPr/>
+        </p:nvSpPr>
+        <p:spPr>
+          <a:xfrm>
+            <a:off x="5214551" y="5787426"/>
+            <a:ext cx="2142125" cy="646331"/>
+          </a:xfrm>
+          <a:prstGeom prst="rect">
+            <a:avLst/>
+          </a:prstGeom>
+          <a:noFill/>
+        </p:spPr>
+        <p:txBody>
+          <a:bodyPr wrap="none" rtlCol="0">
+            <a:spAutoFit/>
+          </a:bodyPr>
+          <a:lstStyle/>
+          <a:p>
+            <a:r>
+              <a:rPr lang="en-US" dirty="0"/>
+              <a:t>Add a new note</a:t>
+            </a:r>
+          </a:p>
+          <a:p>
+            <a:r>
+              <a:rPr lang="en-US" dirty="0"/>
+              <a:t>(Logged in user only)</a:t>
+            </a:r>
+          </a:p>
+        </p:txBody>
+      </p:sp>
+      <p:cxnSp>
+        <p:nvCxnSpPr>
+          <p:cNvPr id="16" name="Straight Arrow Connector 15">
+            <a:extLst>
+              <a:ext uri="{FF2B5EF4-FFF2-40B4-BE49-F238E27FC236}">
+                <a16:creationId xmlns:a16="http://schemas.microsoft.com/office/drawing/2014/main" id="{34AB55B4-4A7D-874F-B19B-34C3C0D1B8E4}"/>
+              </a:ext>
+            </a:extLst>
+          </p:cNvPr>
+          <p:cNvCxnSpPr>
+            <a:cxnSpLocks/>
+            <a:stCxn id="14" idx="3"/>
+            <a:endCxn id="7" idx="4"/>
+          </p:cNvCxnSpPr>
+          <p:nvPr/>
+        </p:nvCxnSpPr>
+        <p:spPr>
+          <a:xfrm flipV="1">
+            <a:off x="7356676" y="5600120"/>
+            <a:ext cx="549717" cy="510472"/>
+          </a:xfrm>
+          <a:prstGeom prst="straightConnector1">
+            <a:avLst/>
+          </a:prstGeom>
+          <a:ln>
+            <a:solidFill>
+              <a:srgbClr val="FF0000"/>
+            </a:solidFill>
+            <a:tailEnd type="triangle"/>
+          </a:ln>
+        </p:spPr>
+        <p:style>
+          <a:lnRef idx="1">
+            <a:schemeClr val="accent1"/>
+          </a:lnRef>
+          <a:fillRef idx="0">
+            <a:schemeClr val="accent1"/>
+          </a:fillRef>
+          <a:effectRef idx="0">
+            <a:schemeClr val="accent1"/>
+          </a:effectRef>
+          <a:fontRef idx="minor">
+            <a:schemeClr val="tx1"/>
+          </a:fontRef>
+        </p:style>
+      </p:cxnSp>
     </p:spTree>
     <p:extLst>
       <p:ext uri="{BB962C8B-B14F-4D97-AF65-F5344CB8AC3E}">
-        <p14:creationId xmlns:p14="http://schemas.microsoft.com/office/powerpoint/2010/main" val="1369724914"/>
+        <p14:creationId xmlns:p14="http://schemas.microsoft.com/office/powerpoint/2010/main" val="882927970"/>
       </p:ext>
     </p:extLst>
   </p:cSld>
@@ -3754,12 +4283,45 @@
           <a:chExt cx="0" cy="0"/>
         </a:xfrm>
       </p:grpSpPr>
+      <p:sp>
+        <p:nvSpPr>
+          <p:cNvPr id="2" name="Title 1">
+            <a:extLst>
+              <a:ext uri="{FF2B5EF4-FFF2-40B4-BE49-F238E27FC236}">
+                <a16:creationId xmlns:a16="http://schemas.microsoft.com/office/drawing/2014/main" id="{05C72050-D6C4-764E-97A5-221C9731AA25}"/>
+              </a:ext>
+            </a:extLst>
+          </p:cNvPr>
+          <p:cNvSpPr>
+            <a:spLocks noGrp="1"/>
+          </p:cNvSpPr>
+          <p:nvPr>
+            <p:ph type="title"/>
+          </p:nvPr>
+        </p:nvSpPr>
+        <p:spPr>
+          <a:xfrm>
+            <a:off x="838200" y="365125"/>
+            <a:ext cx="6205151" cy="1325563"/>
+          </a:xfrm>
+        </p:spPr>
+        <p:txBody>
+          <a:bodyPr/>
+          <a:lstStyle/>
+          <a:p>
+            <a:r>
+              <a:rPr lang="en-US" dirty="0"/>
+              <a:t>All comments for model</a:t>
+            </a:r>
+          </a:p>
+        </p:txBody>
+      </p:sp>
       <p:pic>
         <p:nvPicPr>
-          <p:cNvPr id="5" name="Picture 4">
-            <a:extLst>
-              <a:ext uri="{FF2B5EF4-FFF2-40B4-BE49-F238E27FC236}">
-                <a16:creationId xmlns:a16="http://schemas.microsoft.com/office/drawing/2014/main" id="{0A3BBB96-8DE8-B044-AD41-1125FFDBCF7B}"/>
+          <p:cNvPr id="4" name="Picture 3">
+            <a:extLst>
+              <a:ext uri="{FF2B5EF4-FFF2-40B4-BE49-F238E27FC236}">
+                <a16:creationId xmlns:a16="http://schemas.microsoft.com/office/drawing/2014/main" id="{683789C1-DAD7-8043-9CB9-CC9BB7A7706A}"/>
               </a:ext>
             </a:extLst>
           </p:cNvPr>
@@ -3776,18 +4338,203 @@
         </p:blipFill>
         <p:spPr>
           <a:xfrm>
-            <a:off x="0" y="741947"/>
-            <a:ext cx="12192000" cy="5374105"/>
+            <a:off x="0" y="1838414"/>
+            <a:ext cx="12192000" cy="4808420"/>
           </a:xfrm>
           <a:prstGeom prst="rect">
             <a:avLst/>
           </a:prstGeom>
         </p:spPr>
       </p:pic>
+      <p:sp>
+        <p:nvSpPr>
+          <p:cNvPr id="5" name="Oval 4">
+            <a:extLst>
+              <a:ext uri="{FF2B5EF4-FFF2-40B4-BE49-F238E27FC236}">
+                <a16:creationId xmlns:a16="http://schemas.microsoft.com/office/drawing/2014/main" id="{66B41ABF-7F01-0D4D-BCE9-CA4A7BAE31FA}"/>
+              </a:ext>
+            </a:extLst>
+          </p:cNvPr>
+          <p:cNvSpPr/>
+          <p:nvPr/>
+        </p:nvSpPr>
+        <p:spPr>
+          <a:xfrm flipV="1">
+            <a:off x="6880100" y="2187144"/>
+            <a:ext cx="2066191" cy="1149179"/>
+          </a:xfrm>
+          <a:prstGeom prst="ellipse">
+            <a:avLst/>
+          </a:prstGeom>
+          <a:noFill/>
+          <a:ln>
+            <a:solidFill>
+              <a:srgbClr val="FF0000"/>
+            </a:solidFill>
+          </a:ln>
+        </p:spPr>
+        <p:style>
+          <a:lnRef idx="2">
+            <a:schemeClr val="accent1">
+              <a:shade val="50000"/>
+            </a:schemeClr>
+          </a:lnRef>
+          <a:fillRef idx="1">
+            <a:schemeClr val="accent1"/>
+          </a:fillRef>
+          <a:effectRef idx="0">
+            <a:schemeClr val="accent1"/>
+          </a:effectRef>
+          <a:fontRef idx="minor">
+            <a:schemeClr val="lt1"/>
+          </a:fontRef>
+        </p:style>
+        <p:txBody>
+          <a:bodyPr rtlCol="0" anchor="ctr"/>
+          <a:lstStyle/>
+          <a:p>
+            <a:pPr algn="ctr"/>
+            <a:endParaRPr lang="en-US"/>
+          </a:p>
+        </p:txBody>
+      </p:sp>
+      <p:sp>
+        <p:nvSpPr>
+          <p:cNvPr id="6" name="Oval 5">
+            <a:extLst>
+              <a:ext uri="{FF2B5EF4-FFF2-40B4-BE49-F238E27FC236}">
+                <a16:creationId xmlns:a16="http://schemas.microsoft.com/office/drawing/2014/main" id="{74C92FB2-C8C0-A44D-87C8-C08160AC2548}"/>
+              </a:ext>
+            </a:extLst>
+          </p:cNvPr>
+          <p:cNvSpPr/>
+          <p:nvPr/>
+        </p:nvSpPr>
+        <p:spPr>
+          <a:xfrm flipV="1">
+            <a:off x="11578280" y="3941805"/>
+            <a:ext cx="613719" cy="355172"/>
+          </a:xfrm>
+          <a:prstGeom prst="ellipse">
+            <a:avLst/>
+          </a:prstGeom>
+          <a:noFill/>
+          <a:ln>
+            <a:solidFill>
+              <a:srgbClr val="FF0000"/>
+            </a:solidFill>
+          </a:ln>
+        </p:spPr>
+        <p:style>
+          <a:lnRef idx="2">
+            <a:schemeClr val="accent1">
+              <a:shade val="50000"/>
+            </a:schemeClr>
+          </a:lnRef>
+          <a:fillRef idx="1">
+            <a:schemeClr val="accent1"/>
+          </a:fillRef>
+          <a:effectRef idx="0">
+            <a:schemeClr val="accent1"/>
+          </a:effectRef>
+          <a:fontRef idx="minor">
+            <a:schemeClr val="lt1"/>
+          </a:fontRef>
+        </p:style>
+        <p:txBody>
+          <a:bodyPr rtlCol="0" anchor="ctr"/>
+          <a:lstStyle/>
+          <a:p>
+            <a:pPr algn="ctr"/>
+            <a:endParaRPr lang="en-US"/>
+          </a:p>
+        </p:txBody>
+      </p:sp>
+      <p:sp>
+        <p:nvSpPr>
+          <p:cNvPr id="7" name="TextBox 6">
+            <a:extLst>
+              <a:ext uri="{FF2B5EF4-FFF2-40B4-BE49-F238E27FC236}">
+                <a16:creationId xmlns:a16="http://schemas.microsoft.com/office/drawing/2014/main" id="{B5AA931F-B1F8-A048-870E-347B4DF61184}"/>
+              </a:ext>
+            </a:extLst>
+          </p:cNvPr>
+          <p:cNvSpPr txBox="1"/>
+          <p:nvPr/>
+        </p:nvSpPr>
+        <p:spPr>
+          <a:xfrm>
+            <a:off x="7414054" y="1173892"/>
+            <a:ext cx="1707070" cy="369332"/>
+          </a:xfrm>
+          <a:prstGeom prst="rect">
+            <a:avLst/>
+          </a:prstGeom>
+          <a:noFill/>
+        </p:spPr>
+        <p:txBody>
+          <a:bodyPr wrap="none" rtlCol="0">
+            <a:spAutoFit/>
+          </a:bodyPr>
+          <a:lstStyle/>
+          <a:p>
+            <a:r>
+              <a:rPr lang="en-US" dirty="0"/>
+              <a:t>View / Add note</a:t>
+            </a:r>
+          </a:p>
+        </p:txBody>
+      </p:sp>
+      <p:cxnSp>
+        <p:nvCxnSpPr>
+          <p:cNvPr id="9" name="Straight Arrow Connector 8">
+            <a:extLst>
+              <a:ext uri="{FF2B5EF4-FFF2-40B4-BE49-F238E27FC236}">
+                <a16:creationId xmlns:a16="http://schemas.microsoft.com/office/drawing/2014/main" id="{9A9552F5-337D-3345-8274-6ACC347C69AA}"/>
+              </a:ext>
+            </a:extLst>
+          </p:cNvPr>
+          <p:cNvCxnSpPr>
+            <a:cxnSpLocks/>
+            <a:stCxn id="7" idx="2"/>
+            <a:endCxn id="6" idx="3"/>
+          </p:cNvCxnSpPr>
+          <p:nvPr/>
+        </p:nvCxnSpPr>
+        <p:spPr>
+          <a:xfrm>
+            <a:off x="8267589" y="1543224"/>
+            <a:ext cx="3400568" cy="2450595"/>
+          </a:xfrm>
+          <a:prstGeom prst="straightConnector1">
+            <a:avLst/>
+          </a:prstGeom>
+          <a:ln>
+            <a:solidFill>
+              <a:srgbClr val="FF0000"/>
+            </a:solidFill>
+            <a:tailEnd type="triangle"/>
+          </a:ln>
+        </p:spPr>
+        <p:style>
+          <a:lnRef idx="1">
+            <a:schemeClr val="accent1"/>
+          </a:lnRef>
+          <a:fillRef idx="0">
+            <a:schemeClr val="accent1"/>
+          </a:fillRef>
+          <a:effectRef idx="0">
+            <a:schemeClr val="accent1"/>
+          </a:effectRef>
+          <a:fontRef idx="minor">
+            <a:schemeClr val="tx1"/>
+          </a:fontRef>
+        </p:style>
+      </p:cxnSp>
     </p:spTree>
     <p:extLst>
       <p:ext uri="{BB962C8B-B14F-4D97-AF65-F5344CB8AC3E}">
-        <p14:creationId xmlns:p14="http://schemas.microsoft.com/office/powerpoint/2010/main" val="2819656394"/>
+        <p14:creationId xmlns:p14="http://schemas.microsoft.com/office/powerpoint/2010/main" val="937182911"/>
       </p:ext>
     </p:extLst>
   </p:cSld>
@@ -3869,57 +4616,58 @@
             </a:r>
           </a:p>
           <a:p>
+            <a:pPr lvl="1"/>
             <a:r>
               <a:rPr lang="en-US" dirty="0"/>
-              <a:t>Uses FHIR datatypes and Terminology interaction</a:t>
+              <a:t>Distilled from the complete ‘Uber model’</a:t>
             </a:r>
           </a:p>
           <a:p>
             <a:r>
               <a:rPr lang="en-US" dirty="0"/>
-              <a:t>Comments can be made against any element</a:t>
+              <a:t>Uses FHIR datatypes and Terminology server interaction</a:t>
             </a:r>
           </a:p>
           <a:p>
             <a:pPr lvl="1"/>
             <a:r>
               <a:rPr lang="en-US" dirty="0"/>
-              <a:t>Or the model as a whole</a:t>
-            </a:r>
-          </a:p>
-          <a:p>
+              <a:t>Can filter/display values for a coded element</a:t>
+            </a:r>
+          </a:p>
+          <a:p>
+            <a:r>
+              <a:rPr lang="en-US" dirty="0"/>
+              <a:t>Comments:</a:t>
+            </a:r>
+          </a:p>
+          <a:p>
+            <a:pPr lvl="1"/>
+            <a:r>
+              <a:rPr lang="en-US" dirty="0"/>
+              <a:t>Can be made against any element</a:t>
+            </a:r>
+          </a:p>
+          <a:p>
+            <a:pPr lvl="2"/>
+            <a:r>
+              <a:rPr lang="en-US" dirty="0"/>
+              <a:t>or the model as a whole</a:t>
+            </a:r>
+          </a:p>
+          <a:p>
+            <a:pPr lvl="1"/>
             <a:r>
               <a:rPr lang="en-US" dirty="0"/>
               <a:t>Can make notes against the comments</a:t>
             </a:r>
           </a:p>
           <a:p>
+            <a:pPr lvl="1"/>
             <a:r>
               <a:rPr lang="en-US" dirty="0"/>
-              <a:t>Comments represented as Tasks for formal disposition</a:t>
-            </a:r>
-          </a:p>
-          <a:p>
-            <a:r>
-              <a:rPr lang="en-US" dirty="0"/>
-              <a:t>Link to model</a:t>
-            </a:r>
-          </a:p>
-          <a:p>
-            <a:pPr lvl="1"/>
-            <a:r>
-              <a:rPr lang="en-NZ" dirty="0"/>
-              <a:t>http://</a:t>
-            </a:r>
-            <a:r>
-              <a:rPr lang="en-NZ" dirty="0" err="1"/>
-              <a:t>clinfhir.com</a:t>
-            </a:r>
-            <a:r>
-              <a:rPr lang="en-NZ" dirty="0"/>
-              <a:t>/logicalModeller.html#8c28w</a:t>
-            </a:r>
-            <a:endParaRPr lang="en-US" dirty="0"/>
+              <a:t>Represented as FHIR Tasks for formal disposition</a:t>
+            </a:r>
           </a:p>
         </p:txBody>
       </p:sp>
@@ -4031,6 +4779,20 @@
               <a:t>Can’t edit model</a:t>
             </a:r>
           </a:p>
+          <a:p>
+            <a:r>
+              <a:rPr lang="en-US" dirty="0"/>
+              <a:t>Not used for anything </a:t>
+            </a:r>
+            <a:r>
+              <a:rPr lang="en-US" dirty="0" err="1"/>
+              <a:t>alse</a:t>
+            </a:r>
+            <a:r>
+              <a:rPr lang="en-US" dirty="0"/>
+              <a:t>!</a:t>
+            </a:r>
+          </a:p>
         </p:txBody>
       </p:sp>
       <p:pic>
@@ -4082,7 +4844,7 @@
 </file>
 
 <file path=ppt/slides/slide4.xml><?xml version="1.0" encoding="utf-8"?>
-<p:sld xmlns:a="http://schemas.openxmlformats.org/drawingml/2006/main" xmlns:r="http://schemas.openxmlformats.org/officeDocument/2006/relationships" xmlns:p="http://schemas.openxmlformats.org/presentationml/2006/main">
+<p:sld xmlns:a="http://schemas.openxmlformats.org/drawingml/2006/main" xmlns:r="http://schemas.openxmlformats.org/officeDocument/2006/relationships" xmlns:p="http://schemas.openxmlformats.org/presentationml/2006/main" show="0">
   <p:cSld>
     <p:spTree>
       <p:nvGrpSpPr>
@@ -4456,10 +5218,10 @@
       </p:grpSpPr>
       <p:pic>
         <p:nvPicPr>
-          <p:cNvPr id="5" name="Picture 4">
-            <a:extLst>
-              <a:ext uri="{FF2B5EF4-FFF2-40B4-BE49-F238E27FC236}">
-                <a16:creationId xmlns:a16="http://schemas.microsoft.com/office/drawing/2014/main" id="{0A3BBB96-8DE8-B044-AD41-1125FFDBCF7B}"/>
+          <p:cNvPr id="12" name="Picture 11">
+            <a:extLst>
+              <a:ext uri="{FF2B5EF4-FFF2-40B4-BE49-F238E27FC236}">
+                <a16:creationId xmlns:a16="http://schemas.microsoft.com/office/drawing/2014/main" id="{48F303B3-7135-2B40-93A1-DC94863CD55A}"/>
               </a:ext>
             </a:extLst>
           </p:cNvPr>
@@ -4476,8 +5238,8 @@
         </p:blipFill>
         <p:spPr>
           <a:xfrm>
-            <a:off x="0" y="1483895"/>
-            <a:ext cx="12192000" cy="5374105"/>
+            <a:off x="0" y="1009272"/>
+            <a:ext cx="12192000" cy="5949061"/>
           </a:xfrm>
           <a:prstGeom prst="rect">
             <a:avLst/>
@@ -4486,10 +5248,10 @@
       </p:pic>
       <p:sp>
         <p:nvSpPr>
-          <p:cNvPr id="6" name="Oval 5">
-            <a:extLst>
-              <a:ext uri="{FF2B5EF4-FFF2-40B4-BE49-F238E27FC236}">
-                <a16:creationId xmlns:a16="http://schemas.microsoft.com/office/drawing/2014/main" id="{13483876-5635-0549-9641-CB6C62E21720}"/>
+          <p:cNvPr id="3" name="Oval 2">
+            <a:extLst>
+              <a:ext uri="{FF2B5EF4-FFF2-40B4-BE49-F238E27FC236}">
+                <a16:creationId xmlns:a16="http://schemas.microsoft.com/office/drawing/2014/main" id="{F806BBA6-340E-7F4A-B677-4FD25F45EE6A}"/>
               </a:ext>
             </a:extLst>
           </p:cNvPr>
@@ -4498,8 +5260,8 @@
         </p:nvSpPr>
         <p:spPr>
           <a:xfrm>
-            <a:off x="7979850" y="4838271"/>
-            <a:ext cx="2027063" cy="585627"/>
+            <a:off x="7117492" y="662405"/>
+            <a:ext cx="5070389" cy="5676611"/>
           </a:xfrm>
           <a:prstGeom prst="ellipse">
             <a:avLst/>
@@ -4538,10 +5300,10 @@
       </p:sp>
       <p:sp>
         <p:nvSpPr>
-          <p:cNvPr id="7" name="Title 6">
-            <a:extLst>
-              <a:ext uri="{FF2B5EF4-FFF2-40B4-BE49-F238E27FC236}">
-                <a16:creationId xmlns:a16="http://schemas.microsoft.com/office/drawing/2014/main" id="{B779B904-91EE-C340-9246-47E40D3AFC74}"/>
+          <p:cNvPr id="2" name="Title 1">
+            <a:extLst>
+              <a:ext uri="{FF2B5EF4-FFF2-40B4-BE49-F238E27FC236}">
+                <a16:creationId xmlns:a16="http://schemas.microsoft.com/office/drawing/2014/main" id="{45F23AD7-F492-EE4D-860F-AEB388E113A3}"/>
               </a:ext>
             </a:extLst>
           </p:cNvPr>
@@ -4555,7 +5317,7 @@
         <p:spPr>
           <a:xfrm>
             <a:off x="838200" y="365125"/>
-            <a:ext cx="6934200" cy="1325563"/>
+            <a:ext cx="5253681" cy="882907"/>
           </a:xfrm>
         </p:spPr>
         <p:txBody>
@@ -4564,22 +5326,69 @@
           <a:p>
             <a:r>
               <a:rPr lang="en-US" dirty="0"/>
-              <a:t>View Details of a </a:t>
-            </a:r>
-            <a:r>
-              <a:rPr lang="en-US" dirty="0" err="1"/>
-              <a:t>ValueSet</a:t>
-            </a:r>
-            <a:endParaRPr lang="en-US" dirty="0"/>
-          </a:p>
-        </p:txBody>
-      </p:sp>
-      <p:sp>
-        <p:nvSpPr>
-          <p:cNvPr id="9" name="TextBox 8">
-            <a:extLst>
-              <a:ext uri="{FF2B5EF4-FFF2-40B4-BE49-F238E27FC236}">
-                <a16:creationId xmlns:a16="http://schemas.microsoft.com/office/drawing/2014/main" id="{02C56FD8-4BCD-D44B-B9BC-0CBFA2F6DC45}"/>
+              <a:t>Model: Designer view</a:t>
+            </a:r>
+          </a:p>
+        </p:txBody>
+      </p:sp>
+      <p:sp>
+        <p:nvSpPr>
+          <p:cNvPr id="6" name="Oval 5">
+            <a:extLst>
+              <a:ext uri="{FF2B5EF4-FFF2-40B4-BE49-F238E27FC236}">
+                <a16:creationId xmlns:a16="http://schemas.microsoft.com/office/drawing/2014/main" id="{2686D6CE-207E-BD4C-8EED-B930CE9FF697}"/>
+              </a:ext>
+            </a:extLst>
+          </p:cNvPr>
+          <p:cNvSpPr/>
+          <p:nvPr/>
+        </p:nvSpPr>
+        <p:spPr>
+          <a:xfrm>
+            <a:off x="49427" y="2773722"/>
+            <a:ext cx="2027063" cy="585627"/>
+          </a:xfrm>
+          <a:prstGeom prst="ellipse">
+            <a:avLst/>
+          </a:prstGeom>
+          <a:noFill/>
+          <a:ln>
+            <a:solidFill>
+              <a:srgbClr val="FF0000"/>
+            </a:solidFill>
+          </a:ln>
+        </p:spPr>
+        <p:style>
+          <a:lnRef idx="2">
+            <a:schemeClr val="accent1">
+              <a:shade val="50000"/>
+            </a:schemeClr>
+          </a:lnRef>
+          <a:fillRef idx="1">
+            <a:schemeClr val="accent1"/>
+          </a:fillRef>
+          <a:effectRef idx="0">
+            <a:schemeClr val="accent1"/>
+          </a:effectRef>
+          <a:fontRef idx="minor">
+            <a:schemeClr val="lt1"/>
+          </a:fontRef>
+        </p:style>
+        <p:txBody>
+          <a:bodyPr rtlCol="0" anchor="ctr"/>
+          <a:lstStyle/>
+          <a:p>
+            <a:pPr algn="ctr"/>
+            <a:endParaRPr lang="en-US"/>
+          </a:p>
+        </p:txBody>
+      </p:sp>
+      <p:sp>
+        <p:nvSpPr>
+          <p:cNvPr id="7" name="TextBox 6">
+            <a:extLst>
+              <a:ext uri="{FF2B5EF4-FFF2-40B4-BE49-F238E27FC236}">
+                <a16:creationId xmlns:a16="http://schemas.microsoft.com/office/drawing/2014/main" id="{AC1EC98F-FAD2-B642-B54A-594785369B53}"/>
               </a:ext>
             </a:extLst>
           </p:cNvPr>
@@ -4588,8 +5397,8 @@
         </p:nvSpPr>
         <p:spPr>
           <a:xfrm>
-            <a:off x="9094573" y="729049"/>
-            <a:ext cx="1739387" cy="369332"/>
+            <a:off x="2520778" y="4386649"/>
+            <a:ext cx="1578766" cy="369332"/>
           </a:xfrm>
           <a:prstGeom prst="rect">
             <a:avLst/>
@@ -4604,34 +5413,117 @@
           <a:p>
             <a:r>
               <a:rPr lang="en-US" dirty="0"/>
-              <a:t>Click link to view</a:t>
+              <a:t>Select Element</a:t>
             </a:r>
           </a:p>
         </p:txBody>
       </p:sp>
       <p:cxnSp>
         <p:nvCxnSpPr>
-          <p:cNvPr id="11" name="Straight Arrow Connector 10">
-            <a:extLst>
-              <a:ext uri="{FF2B5EF4-FFF2-40B4-BE49-F238E27FC236}">
-                <a16:creationId xmlns:a16="http://schemas.microsoft.com/office/drawing/2014/main" id="{525F4EF7-0744-564A-986D-48DA07C26558}"/>
+          <p:cNvPr id="9" name="Straight Arrow Connector 8">
+            <a:extLst>
+              <a:ext uri="{FF2B5EF4-FFF2-40B4-BE49-F238E27FC236}">
+                <a16:creationId xmlns:a16="http://schemas.microsoft.com/office/drawing/2014/main" id="{43C213D7-C617-B04A-9F41-44CAB0B95288}"/>
               </a:ext>
             </a:extLst>
           </p:cNvPr>
           <p:cNvCxnSpPr>
-            <a:stCxn id="9" idx="2"/>
+            <a:stCxn id="7" idx="1"/>
+            <a:endCxn id="6" idx="6"/>
           </p:cNvCxnSpPr>
           <p:nvPr/>
         </p:nvCxnSpPr>
         <p:spPr>
-          <a:xfrm flipH="1">
-            <a:off x="9428205" y="1098381"/>
-            <a:ext cx="536062" cy="3739890"/>
+          <a:xfrm flipH="1" flipV="1">
+            <a:off x="2076490" y="3066536"/>
+            <a:ext cx="444288" cy="1504779"/>
           </a:xfrm>
           <a:prstGeom prst="straightConnector1">
             <a:avLst/>
           </a:prstGeom>
           <a:ln>
+            <a:solidFill>
+              <a:srgbClr val="FF0000"/>
+            </a:solidFill>
+            <a:tailEnd type="triangle"/>
+          </a:ln>
+        </p:spPr>
+        <p:style>
+          <a:lnRef idx="1">
+            <a:schemeClr val="accent1"/>
+          </a:lnRef>
+          <a:fillRef idx="0">
+            <a:schemeClr val="accent1"/>
+          </a:fillRef>
+          <a:effectRef idx="0">
+            <a:schemeClr val="accent1"/>
+          </a:effectRef>
+          <a:fontRef idx="minor">
+            <a:schemeClr val="tx1"/>
+          </a:fontRef>
+        </p:style>
+      </p:cxnSp>
+      <p:sp>
+        <p:nvSpPr>
+          <p:cNvPr id="11" name="TextBox 10">
+            <a:extLst>
+              <a:ext uri="{FF2B5EF4-FFF2-40B4-BE49-F238E27FC236}">
+                <a16:creationId xmlns:a16="http://schemas.microsoft.com/office/drawing/2014/main" id="{47886C04-42A7-A843-B7D3-5A7A39044F42}"/>
+              </a:ext>
+            </a:extLst>
+          </p:cNvPr>
+          <p:cNvSpPr txBox="1"/>
+          <p:nvPr/>
+        </p:nvSpPr>
+        <p:spPr>
+          <a:xfrm>
+            <a:off x="6858000" y="556054"/>
+            <a:ext cx="821828" cy="369332"/>
+          </a:xfrm>
+          <a:prstGeom prst="rect">
+            <a:avLst/>
+          </a:prstGeom>
+          <a:noFill/>
+        </p:spPr>
+        <p:txBody>
+          <a:bodyPr wrap="none" rtlCol="0">
+            <a:spAutoFit/>
+          </a:bodyPr>
+          <a:lstStyle/>
+          <a:p>
+            <a:r>
+              <a:rPr lang="en-US" dirty="0"/>
+              <a:t>Details</a:t>
+            </a:r>
+          </a:p>
+        </p:txBody>
+      </p:sp>
+      <p:cxnSp>
+        <p:nvCxnSpPr>
+          <p:cNvPr id="13" name="Straight Arrow Connector 12">
+            <a:extLst>
+              <a:ext uri="{FF2B5EF4-FFF2-40B4-BE49-F238E27FC236}">
+                <a16:creationId xmlns:a16="http://schemas.microsoft.com/office/drawing/2014/main" id="{5D356377-12F4-EC41-BDB0-AEDB98826C30}"/>
+              </a:ext>
+            </a:extLst>
+          </p:cNvPr>
+          <p:cNvCxnSpPr>
+            <a:stCxn id="11" idx="2"/>
+          </p:cNvCxnSpPr>
+          <p:nvPr/>
+        </p:nvCxnSpPr>
+        <p:spPr>
+          <a:xfrm>
+            <a:off x="7268914" y="925386"/>
+            <a:ext cx="565270" cy="558509"/>
+          </a:xfrm>
+          <a:prstGeom prst="straightConnector1">
+            <a:avLst/>
+          </a:prstGeom>
+          <a:ln>
+            <a:solidFill>
+              <a:srgbClr val="FF0000"/>
+            </a:solidFill>
             <a:tailEnd type="triangle"/>
           </a:ln>
         </p:spPr>
@@ -4653,7 +5545,7 @@
     </p:spTree>
     <p:extLst>
       <p:ext uri="{BB962C8B-B14F-4D97-AF65-F5344CB8AC3E}">
-        <p14:creationId xmlns:p14="http://schemas.microsoft.com/office/powerpoint/2010/main" val="3403951051"/>
+        <p14:creationId xmlns:p14="http://schemas.microsoft.com/office/powerpoint/2010/main" val="1984017104"/>
       </p:ext>
     </p:extLst>
   </p:cSld>
@@ -4680,44 +5572,12 @@
           <a:chExt cx="0" cy="0"/>
         </a:xfrm>
       </p:grpSpPr>
-      <p:sp>
-        <p:nvSpPr>
-          <p:cNvPr id="4" name="Title 3">
-            <a:extLst>
-              <a:ext uri="{FF2B5EF4-FFF2-40B4-BE49-F238E27FC236}">
-                <a16:creationId xmlns:a16="http://schemas.microsoft.com/office/drawing/2014/main" id="{1EEF286D-5AFE-A34F-8DEF-B201DBE2929D}"/>
-              </a:ext>
-            </a:extLst>
-          </p:cNvPr>
-          <p:cNvSpPr>
-            <a:spLocks noGrp="1"/>
-          </p:cNvSpPr>
-          <p:nvPr>
-            <p:ph type="title"/>
-          </p:nvPr>
-        </p:nvSpPr>
-        <p:spPr/>
-        <p:txBody>
-          <a:bodyPr/>
-          <a:lstStyle/>
-          <a:p>
-            <a:r>
-              <a:rPr lang="en-US" dirty="0" err="1"/>
-              <a:t>ValueSet</a:t>
-            </a:r>
-            <a:r>
-              <a:rPr lang="en-US" dirty="0"/>
-              <a:t> browser</a:t>
-            </a:r>
-          </a:p>
-        </p:txBody>
-      </p:sp>
       <p:pic>
         <p:nvPicPr>
-          <p:cNvPr id="6" name="Picture 5">
-            <a:extLst>
-              <a:ext uri="{FF2B5EF4-FFF2-40B4-BE49-F238E27FC236}">
-                <a16:creationId xmlns:a16="http://schemas.microsoft.com/office/drawing/2014/main" id="{55B7643C-BF5A-5C4E-8AC4-03C81ADCDB26}"/>
+          <p:cNvPr id="12" name="Picture 11">
+            <a:extLst>
+              <a:ext uri="{FF2B5EF4-FFF2-40B4-BE49-F238E27FC236}">
+                <a16:creationId xmlns:a16="http://schemas.microsoft.com/office/drawing/2014/main" id="{79FE2365-F4DE-D547-B6E1-506B9D2FA482}"/>
               </a:ext>
             </a:extLst>
           </p:cNvPr>
@@ -4734,8 +5594,8 @@
         </p:blipFill>
         <p:spPr>
           <a:xfrm>
-            <a:off x="3446505" y="1904258"/>
-            <a:ext cx="7907295" cy="4256272"/>
+            <a:off x="0" y="947629"/>
+            <a:ext cx="12192000" cy="5949061"/>
           </a:xfrm>
           <a:prstGeom prst="rect">
             <a:avLst/>
@@ -4744,10 +5604,10 @@
       </p:pic>
       <p:sp>
         <p:nvSpPr>
-          <p:cNvPr id="7" name="Oval 6">
-            <a:extLst>
-              <a:ext uri="{FF2B5EF4-FFF2-40B4-BE49-F238E27FC236}">
-                <a16:creationId xmlns:a16="http://schemas.microsoft.com/office/drawing/2014/main" id="{8C0C0C30-8FAB-BC42-9341-CCCBF865FAB7}"/>
+          <p:cNvPr id="3" name="Oval 2">
+            <a:extLst>
+              <a:ext uri="{FF2B5EF4-FFF2-40B4-BE49-F238E27FC236}">
+                <a16:creationId xmlns:a16="http://schemas.microsoft.com/office/drawing/2014/main" id="{F806BBA6-340E-7F4A-B677-4FD25F45EE6A}"/>
               </a:ext>
             </a:extLst>
           </p:cNvPr>
@@ -4756,8 +5616,8 @@
         </p:nvSpPr>
         <p:spPr>
           <a:xfrm>
-            <a:off x="4705310" y="3021828"/>
-            <a:ext cx="2027063" cy="585627"/>
+            <a:off x="7006975" y="2506894"/>
+            <a:ext cx="2270589" cy="339048"/>
           </a:xfrm>
           <a:prstGeom prst="ellipse">
             <a:avLst/>
@@ -4796,89 +5656,45 @@
       </p:sp>
       <p:sp>
         <p:nvSpPr>
-          <p:cNvPr id="8" name="TextBox 7">
-            <a:extLst>
-              <a:ext uri="{FF2B5EF4-FFF2-40B4-BE49-F238E27FC236}">
-                <a16:creationId xmlns:a16="http://schemas.microsoft.com/office/drawing/2014/main" id="{E40F1ACE-D77C-5140-95DF-AD0D6506242C}"/>
-              </a:ext>
-            </a:extLst>
-          </p:cNvPr>
-          <p:cNvSpPr txBox="1"/>
-          <p:nvPr/>
-        </p:nvSpPr>
-        <p:spPr>
-          <a:xfrm>
-            <a:off x="691979" y="3238123"/>
-            <a:ext cx="2332498" cy="369332"/>
-          </a:xfrm>
-          <a:prstGeom prst="rect">
-            <a:avLst/>
-          </a:prstGeom>
-          <a:noFill/>
-        </p:spPr>
-        <p:txBody>
-          <a:bodyPr wrap="none" rtlCol="0">
-            <a:spAutoFit/>
+          <p:cNvPr id="2" name="Title 1">
+            <a:extLst>
+              <a:ext uri="{FF2B5EF4-FFF2-40B4-BE49-F238E27FC236}">
+                <a16:creationId xmlns:a16="http://schemas.microsoft.com/office/drawing/2014/main" id="{45F23AD7-F492-EE4D-860F-AEB388E113A3}"/>
+              </a:ext>
+            </a:extLst>
+          </p:cNvPr>
+          <p:cNvSpPr>
+            <a:spLocks noGrp="1"/>
+          </p:cNvSpPr>
+          <p:nvPr>
+            <p:ph type="title"/>
+          </p:nvPr>
+        </p:nvSpPr>
+        <p:spPr>
+          <a:xfrm>
+            <a:off x="838200" y="365125"/>
+            <a:ext cx="5253681" cy="882907"/>
+          </a:xfrm>
+        </p:spPr>
+        <p:txBody>
+          <a:bodyPr>
+            <a:normAutofit fontScale="90000"/>
           </a:bodyPr>
           <a:lstStyle/>
           <a:p>
             <a:r>
               <a:rPr lang="en-US" dirty="0"/>
-              <a:t>Filter by concept name</a:t>
-            </a:r>
-          </a:p>
-        </p:txBody>
-      </p:sp>
-      <p:cxnSp>
-        <p:nvCxnSpPr>
-          <p:cNvPr id="10" name="Straight Arrow Connector 9">
-            <a:extLst>
-              <a:ext uri="{FF2B5EF4-FFF2-40B4-BE49-F238E27FC236}">
-                <a16:creationId xmlns:a16="http://schemas.microsoft.com/office/drawing/2014/main" id="{72834669-9CAE-F548-B39D-DB8169295ABF}"/>
-              </a:ext>
-            </a:extLst>
-          </p:cNvPr>
-          <p:cNvCxnSpPr>
-            <a:stCxn id="8" idx="3"/>
-          </p:cNvCxnSpPr>
-          <p:nvPr/>
-        </p:nvCxnSpPr>
-        <p:spPr>
-          <a:xfrm flipV="1">
-            <a:off x="3024477" y="3314641"/>
-            <a:ext cx="1680833" cy="108148"/>
-          </a:xfrm>
-          <a:prstGeom prst="straightConnector1">
-            <a:avLst/>
-          </a:prstGeom>
-          <a:ln w="22225">
-            <a:solidFill>
-              <a:srgbClr val="FF0000"/>
-            </a:solidFill>
-            <a:tailEnd type="triangle"/>
-          </a:ln>
-        </p:spPr>
-        <p:style>
-          <a:lnRef idx="1">
-            <a:schemeClr val="accent1"/>
-          </a:lnRef>
-          <a:fillRef idx="0">
-            <a:schemeClr val="accent1"/>
-          </a:fillRef>
-          <a:effectRef idx="0">
-            <a:schemeClr val="accent1"/>
-          </a:effectRef>
-          <a:fontRef idx="minor">
-            <a:schemeClr val="tx1"/>
-          </a:fontRef>
-        </p:style>
-      </p:cxnSp>
-      <p:sp>
-        <p:nvSpPr>
-          <p:cNvPr id="11" name="Oval 10">
-            <a:extLst>
-              <a:ext uri="{FF2B5EF4-FFF2-40B4-BE49-F238E27FC236}">
-                <a16:creationId xmlns:a16="http://schemas.microsoft.com/office/drawing/2014/main" id="{7442DF2A-5E3D-2343-969D-E8B988111052}"/>
+              <a:t>Model: Element Details</a:t>
+            </a:r>
+          </a:p>
+        </p:txBody>
+      </p:sp>
+      <p:sp>
+        <p:nvSpPr>
+          <p:cNvPr id="6" name="Oval 5">
+            <a:extLst>
+              <a:ext uri="{FF2B5EF4-FFF2-40B4-BE49-F238E27FC236}">
+                <a16:creationId xmlns:a16="http://schemas.microsoft.com/office/drawing/2014/main" id="{2686D6CE-207E-BD4C-8EED-B930CE9FF697}"/>
               </a:ext>
             </a:extLst>
           </p:cNvPr>
@@ -4887,8 +5703,8 @@
         </p:nvSpPr>
         <p:spPr>
           <a:xfrm>
-            <a:off x="9885405" y="3021828"/>
-            <a:ext cx="1208903" cy="585627"/>
+            <a:off x="49427" y="2773722"/>
+            <a:ext cx="2027063" cy="585627"/>
           </a:xfrm>
           <a:prstGeom prst="ellipse">
             <a:avLst/>
@@ -4927,10 +5743,10 @@
       </p:sp>
       <p:sp>
         <p:nvSpPr>
-          <p:cNvPr id="12" name="TextBox 11">
-            <a:extLst>
-              <a:ext uri="{FF2B5EF4-FFF2-40B4-BE49-F238E27FC236}">
-                <a16:creationId xmlns:a16="http://schemas.microsoft.com/office/drawing/2014/main" id="{3D213F94-F7F2-D74D-8A1F-17ADD6D0E76B}"/>
+          <p:cNvPr id="7" name="TextBox 6">
+            <a:extLst>
+              <a:ext uri="{FF2B5EF4-FFF2-40B4-BE49-F238E27FC236}">
+                <a16:creationId xmlns:a16="http://schemas.microsoft.com/office/drawing/2014/main" id="{AC1EC98F-FAD2-B642-B54A-594785369B53}"/>
               </a:ext>
             </a:extLst>
           </p:cNvPr>
@@ -4939,8 +5755,8 @@
         </p:nvSpPr>
         <p:spPr>
           <a:xfrm>
-            <a:off x="8760941" y="1027906"/>
-            <a:ext cx="3170996" cy="369332"/>
+            <a:off x="2520778" y="4386649"/>
+            <a:ext cx="1578766" cy="369332"/>
           </a:xfrm>
           <a:prstGeom prst="rect">
             <a:avLst/>
@@ -4955,34 +5771,350 @@
           <a:p>
             <a:r>
               <a:rPr lang="en-US" dirty="0"/>
-              <a:t>Click to view matching concepts</a:t>
+              <a:t>Select Element</a:t>
             </a:r>
           </a:p>
         </p:txBody>
       </p:sp>
       <p:cxnSp>
         <p:nvCxnSpPr>
-          <p:cNvPr id="14" name="Straight Arrow Connector 13">
-            <a:extLst>
-              <a:ext uri="{FF2B5EF4-FFF2-40B4-BE49-F238E27FC236}">
-                <a16:creationId xmlns:a16="http://schemas.microsoft.com/office/drawing/2014/main" id="{96C1D963-B095-294A-A827-6C23DC7C3C13}"/>
+          <p:cNvPr id="9" name="Straight Arrow Connector 8">
+            <a:extLst>
+              <a:ext uri="{FF2B5EF4-FFF2-40B4-BE49-F238E27FC236}">
+                <a16:creationId xmlns:a16="http://schemas.microsoft.com/office/drawing/2014/main" id="{43C213D7-C617-B04A-9F41-44CAB0B95288}"/>
               </a:ext>
             </a:extLst>
           </p:cNvPr>
           <p:cNvCxnSpPr>
-            <a:stCxn id="12" idx="2"/>
+            <a:stCxn id="7" idx="1"/>
+            <a:endCxn id="6" idx="6"/>
           </p:cNvCxnSpPr>
           <p:nvPr/>
         </p:nvCxnSpPr>
         <p:spPr>
-          <a:xfrm>
-            <a:off x="10346439" y="1397238"/>
-            <a:ext cx="143417" cy="1624590"/>
+          <a:xfrm flipH="1" flipV="1">
+            <a:off x="2076490" y="3066536"/>
+            <a:ext cx="444288" cy="1504779"/>
           </a:xfrm>
           <a:prstGeom prst="straightConnector1">
             <a:avLst/>
           </a:prstGeom>
-          <a:ln w="25400">
+          <a:ln>
+            <a:solidFill>
+              <a:srgbClr val="FF0000"/>
+            </a:solidFill>
+            <a:tailEnd type="triangle"/>
+          </a:ln>
+        </p:spPr>
+        <p:style>
+          <a:lnRef idx="1">
+            <a:schemeClr val="accent1"/>
+          </a:lnRef>
+          <a:fillRef idx="0">
+            <a:schemeClr val="accent1"/>
+          </a:fillRef>
+          <a:effectRef idx="0">
+            <a:schemeClr val="accent1"/>
+          </a:effectRef>
+          <a:fontRef idx="minor">
+            <a:schemeClr val="tx1"/>
+          </a:fontRef>
+        </p:style>
+      </p:cxnSp>
+      <p:sp>
+        <p:nvSpPr>
+          <p:cNvPr id="11" name="TextBox 10">
+            <a:extLst>
+              <a:ext uri="{FF2B5EF4-FFF2-40B4-BE49-F238E27FC236}">
+                <a16:creationId xmlns:a16="http://schemas.microsoft.com/office/drawing/2014/main" id="{47886C04-42A7-A843-B7D3-5A7A39044F42}"/>
+              </a:ext>
+            </a:extLst>
+          </p:cNvPr>
+          <p:cNvSpPr txBox="1"/>
+          <p:nvPr/>
+        </p:nvSpPr>
+        <p:spPr>
+          <a:xfrm>
+            <a:off x="6858000" y="556054"/>
+            <a:ext cx="3645678" cy="369332"/>
+          </a:xfrm>
+          <a:prstGeom prst="rect">
+            <a:avLst/>
+          </a:prstGeom>
+          <a:noFill/>
+        </p:spPr>
+        <p:txBody>
+          <a:bodyPr wrap="none" rtlCol="0">
+            <a:spAutoFit/>
+          </a:bodyPr>
+          <a:lstStyle/>
+          <a:p>
+            <a:r>
+              <a:rPr lang="en-US" dirty="0"/>
+              <a:t>How sure we are about this element </a:t>
+            </a:r>
+          </a:p>
+        </p:txBody>
+      </p:sp>
+      <p:cxnSp>
+        <p:nvCxnSpPr>
+          <p:cNvPr id="13" name="Straight Arrow Connector 12">
+            <a:extLst>
+              <a:ext uri="{FF2B5EF4-FFF2-40B4-BE49-F238E27FC236}">
+                <a16:creationId xmlns:a16="http://schemas.microsoft.com/office/drawing/2014/main" id="{5D356377-12F4-EC41-BDB0-AEDB98826C30}"/>
+              </a:ext>
+            </a:extLst>
+          </p:cNvPr>
+          <p:cNvCxnSpPr>
+            <a:cxnSpLocks/>
+            <a:stCxn id="11" idx="2"/>
+          </p:cNvCxnSpPr>
+          <p:nvPr/>
+        </p:nvCxnSpPr>
+        <p:spPr>
+          <a:xfrm flipH="1">
+            <a:off x="8106313" y="925386"/>
+            <a:ext cx="574526" cy="1581508"/>
+          </a:xfrm>
+          <a:prstGeom prst="straightConnector1">
+            <a:avLst/>
+          </a:prstGeom>
+          <a:ln>
+            <a:solidFill>
+              <a:srgbClr val="FF0000"/>
+            </a:solidFill>
+            <a:tailEnd type="triangle"/>
+          </a:ln>
+        </p:spPr>
+        <p:style>
+          <a:lnRef idx="1">
+            <a:schemeClr val="accent1"/>
+          </a:lnRef>
+          <a:fillRef idx="0">
+            <a:schemeClr val="accent1"/>
+          </a:fillRef>
+          <a:effectRef idx="0">
+            <a:schemeClr val="accent1"/>
+          </a:effectRef>
+          <a:fontRef idx="minor">
+            <a:schemeClr val="tx1"/>
+          </a:fontRef>
+        </p:style>
+      </p:cxnSp>
+      <p:sp>
+        <p:nvSpPr>
+          <p:cNvPr id="14" name="Oval 13">
+            <a:extLst>
+              <a:ext uri="{FF2B5EF4-FFF2-40B4-BE49-F238E27FC236}">
+                <a16:creationId xmlns:a16="http://schemas.microsoft.com/office/drawing/2014/main" id="{2FF9DC81-01A6-6044-884B-3CC0A4372DA2}"/>
+              </a:ext>
+            </a:extLst>
+          </p:cNvPr>
+          <p:cNvSpPr/>
+          <p:nvPr/>
+        </p:nvSpPr>
+        <p:spPr>
+          <a:xfrm>
+            <a:off x="7159375" y="5638798"/>
+            <a:ext cx="2270589" cy="339048"/>
+          </a:xfrm>
+          <a:prstGeom prst="ellipse">
+            <a:avLst/>
+          </a:prstGeom>
+          <a:noFill/>
+          <a:ln>
+            <a:solidFill>
+              <a:srgbClr val="FF0000"/>
+            </a:solidFill>
+          </a:ln>
+        </p:spPr>
+        <p:style>
+          <a:lnRef idx="2">
+            <a:schemeClr val="accent1">
+              <a:shade val="50000"/>
+            </a:schemeClr>
+          </a:lnRef>
+          <a:fillRef idx="1">
+            <a:schemeClr val="accent1"/>
+          </a:fillRef>
+          <a:effectRef idx="0">
+            <a:schemeClr val="accent1"/>
+          </a:effectRef>
+          <a:fontRef idx="minor">
+            <a:schemeClr val="lt1"/>
+          </a:fontRef>
+        </p:style>
+        <p:txBody>
+          <a:bodyPr rtlCol="0" anchor="ctr"/>
+          <a:lstStyle/>
+          <a:p>
+            <a:pPr algn="ctr"/>
+            <a:endParaRPr lang="en-US"/>
+          </a:p>
+        </p:txBody>
+      </p:sp>
+      <p:cxnSp>
+        <p:nvCxnSpPr>
+          <p:cNvPr id="15" name="Straight Arrow Connector 14">
+            <a:extLst>
+              <a:ext uri="{FF2B5EF4-FFF2-40B4-BE49-F238E27FC236}">
+                <a16:creationId xmlns:a16="http://schemas.microsoft.com/office/drawing/2014/main" id="{F5F1D412-449E-4445-8C45-772B6F904174}"/>
+              </a:ext>
+            </a:extLst>
+          </p:cNvPr>
+          <p:cNvCxnSpPr>
+            <a:cxnSpLocks/>
+            <a:endCxn id="14" idx="2"/>
+          </p:cNvCxnSpPr>
+          <p:nvPr/>
+        </p:nvCxnSpPr>
+        <p:spPr>
+          <a:xfrm>
+            <a:off x="5661137" y="3967504"/>
+            <a:ext cx="1498238" cy="1840818"/>
+          </a:xfrm>
+          <a:prstGeom prst="straightConnector1">
+            <a:avLst/>
+          </a:prstGeom>
+          <a:ln>
+            <a:solidFill>
+              <a:srgbClr val="FF0000"/>
+            </a:solidFill>
+            <a:tailEnd type="triangle"/>
+          </a:ln>
+        </p:spPr>
+        <p:style>
+          <a:lnRef idx="1">
+            <a:schemeClr val="accent1"/>
+          </a:lnRef>
+          <a:fillRef idx="0">
+            <a:schemeClr val="accent1"/>
+          </a:fillRef>
+          <a:effectRef idx="0">
+            <a:schemeClr val="accent1"/>
+          </a:effectRef>
+          <a:fontRef idx="minor">
+            <a:schemeClr val="tx1"/>
+          </a:fontRef>
+        </p:style>
+      </p:cxnSp>
+      <p:sp>
+        <p:nvSpPr>
+          <p:cNvPr id="18" name="TextBox 17">
+            <a:extLst>
+              <a:ext uri="{FF2B5EF4-FFF2-40B4-BE49-F238E27FC236}">
+                <a16:creationId xmlns:a16="http://schemas.microsoft.com/office/drawing/2014/main" id="{DFC3D029-7B2F-6440-A780-95F032E45ED5}"/>
+              </a:ext>
+            </a:extLst>
+          </p:cNvPr>
+          <p:cNvSpPr txBox="1"/>
+          <p:nvPr/>
+        </p:nvSpPr>
+        <p:spPr>
+          <a:xfrm>
+            <a:off x="5362601" y="3667101"/>
+            <a:ext cx="1796774" cy="646331"/>
+          </a:xfrm>
+          <a:prstGeom prst="rect">
+            <a:avLst/>
+          </a:prstGeom>
+          <a:noFill/>
+        </p:spPr>
+        <p:txBody>
+          <a:bodyPr wrap="none" rtlCol="0">
+            <a:spAutoFit/>
+          </a:bodyPr>
+          <a:lstStyle/>
+          <a:p>
+            <a:r>
+              <a:rPr lang="en-US" dirty="0"/>
+              <a:t>‘type’ of element</a:t>
+            </a:r>
+          </a:p>
+          <a:p>
+            <a:pPr algn="r"/>
+            <a:r>
+              <a:rPr lang="en-US" dirty="0"/>
+              <a:t>(view parts)</a:t>
+            </a:r>
+          </a:p>
+        </p:txBody>
+      </p:sp>
+      <p:sp>
+        <p:nvSpPr>
+          <p:cNvPr id="19" name="Oval 18">
+            <a:extLst>
+              <a:ext uri="{FF2B5EF4-FFF2-40B4-BE49-F238E27FC236}">
+                <a16:creationId xmlns:a16="http://schemas.microsoft.com/office/drawing/2014/main" id="{0C763197-F2DF-8349-8253-5CD16F32EE7C}"/>
+              </a:ext>
+            </a:extLst>
+          </p:cNvPr>
+          <p:cNvSpPr/>
+          <p:nvPr/>
+        </p:nvSpPr>
+        <p:spPr>
+          <a:xfrm>
+            <a:off x="11250202" y="5657636"/>
+            <a:ext cx="931522" cy="339048"/>
+          </a:xfrm>
+          <a:prstGeom prst="ellipse">
+            <a:avLst/>
+          </a:prstGeom>
+          <a:noFill/>
+          <a:ln>
+            <a:solidFill>
+              <a:srgbClr val="FF0000"/>
+            </a:solidFill>
+          </a:ln>
+        </p:spPr>
+        <p:style>
+          <a:lnRef idx="2">
+            <a:schemeClr val="accent1">
+              <a:shade val="50000"/>
+            </a:schemeClr>
+          </a:lnRef>
+          <a:fillRef idx="1">
+            <a:schemeClr val="accent1"/>
+          </a:fillRef>
+          <a:effectRef idx="0">
+            <a:schemeClr val="accent1"/>
+          </a:effectRef>
+          <a:fontRef idx="minor">
+            <a:schemeClr val="lt1"/>
+          </a:fontRef>
+        </p:style>
+        <p:txBody>
+          <a:bodyPr rtlCol="0" anchor="ctr"/>
+          <a:lstStyle/>
+          <a:p>
+            <a:pPr algn="ctr"/>
+            <a:endParaRPr lang="en-US"/>
+          </a:p>
+        </p:txBody>
+      </p:sp>
+      <p:cxnSp>
+        <p:nvCxnSpPr>
+          <p:cNvPr id="20" name="Straight Arrow Connector 19">
+            <a:extLst>
+              <a:ext uri="{FF2B5EF4-FFF2-40B4-BE49-F238E27FC236}">
+                <a16:creationId xmlns:a16="http://schemas.microsoft.com/office/drawing/2014/main" id="{9237E617-FEF9-7049-B450-82652A9CB313}"/>
+              </a:ext>
+            </a:extLst>
+          </p:cNvPr>
+          <p:cNvCxnSpPr>
+            <a:cxnSpLocks/>
+          </p:cNvCxnSpPr>
+          <p:nvPr/>
+        </p:nvCxnSpPr>
+        <p:spPr>
+          <a:xfrm>
+            <a:off x="7006975" y="4178188"/>
+            <a:ext cx="4251944" cy="1630134"/>
+          </a:xfrm>
+          <a:prstGeom prst="straightConnector1">
+            <a:avLst/>
+          </a:prstGeom>
+          <a:ln>
             <a:solidFill>
               <a:srgbClr val="FF0000"/>
             </a:solidFill>
@@ -5007,7 +6139,7 @@
     </p:spTree>
     <p:extLst>
       <p:ext uri="{BB962C8B-B14F-4D97-AF65-F5344CB8AC3E}">
-        <p14:creationId xmlns:p14="http://schemas.microsoft.com/office/powerpoint/2010/main" val="2449245863"/>
+        <p14:creationId xmlns:p14="http://schemas.microsoft.com/office/powerpoint/2010/main" val="2905597660"/>
       </p:ext>
     </p:extLst>
   </p:cSld>
@@ -5034,12 +6166,94 @@
           <a:chExt cx="0" cy="0"/>
         </a:xfrm>
       </p:grpSpPr>
-      <p:sp>
-        <p:nvSpPr>
-          <p:cNvPr id="2" name="Title 1">
-            <a:extLst>
-              <a:ext uri="{FF2B5EF4-FFF2-40B4-BE49-F238E27FC236}">
-                <a16:creationId xmlns:a16="http://schemas.microsoft.com/office/drawing/2014/main" id="{D7C244DA-7206-C342-A789-040821F18829}"/>
+      <p:pic>
+        <p:nvPicPr>
+          <p:cNvPr id="5" name="Picture 4">
+            <a:extLst>
+              <a:ext uri="{FF2B5EF4-FFF2-40B4-BE49-F238E27FC236}">
+                <a16:creationId xmlns:a16="http://schemas.microsoft.com/office/drawing/2014/main" id="{0A3BBB96-8DE8-B044-AD41-1125FFDBCF7B}"/>
+              </a:ext>
+            </a:extLst>
+          </p:cNvPr>
+          <p:cNvPicPr>
+            <a:picLocks noChangeAspect="1"/>
+          </p:cNvPicPr>
+          <p:nvPr/>
+        </p:nvPicPr>
+        <p:blipFill>
+          <a:blip r:embed="rId2"/>
+          <a:stretch>
+            <a:fillRect/>
+          </a:stretch>
+        </p:blipFill>
+        <p:spPr>
+          <a:xfrm>
+            <a:off x="0" y="1483895"/>
+            <a:ext cx="12192000" cy="5374105"/>
+          </a:xfrm>
+          <a:prstGeom prst="rect">
+            <a:avLst/>
+          </a:prstGeom>
+        </p:spPr>
+      </p:pic>
+      <p:sp>
+        <p:nvSpPr>
+          <p:cNvPr id="6" name="Oval 5">
+            <a:extLst>
+              <a:ext uri="{FF2B5EF4-FFF2-40B4-BE49-F238E27FC236}">
+                <a16:creationId xmlns:a16="http://schemas.microsoft.com/office/drawing/2014/main" id="{13483876-5635-0549-9641-CB6C62E21720}"/>
+              </a:ext>
+            </a:extLst>
+          </p:cNvPr>
+          <p:cNvSpPr/>
+          <p:nvPr/>
+        </p:nvSpPr>
+        <p:spPr>
+          <a:xfrm>
+            <a:off x="7979850" y="4838271"/>
+            <a:ext cx="2027063" cy="585627"/>
+          </a:xfrm>
+          <a:prstGeom prst="ellipse">
+            <a:avLst/>
+          </a:prstGeom>
+          <a:noFill/>
+          <a:ln>
+            <a:solidFill>
+              <a:srgbClr val="FF0000"/>
+            </a:solidFill>
+          </a:ln>
+        </p:spPr>
+        <p:style>
+          <a:lnRef idx="2">
+            <a:schemeClr val="accent1">
+              <a:shade val="50000"/>
+            </a:schemeClr>
+          </a:lnRef>
+          <a:fillRef idx="1">
+            <a:schemeClr val="accent1"/>
+          </a:fillRef>
+          <a:effectRef idx="0">
+            <a:schemeClr val="accent1"/>
+          </a:effectRef>
+          <a:fontRef idx="minor">
+            <a:schemeClr val="lt1"/>
+          </a:fontRef>
+        </p:style>
+        <p:txBody>
+          <a:bodyPr rtlCol="0" anchor="ctr"/>
+          <a:lstStyle/>
+          <a:p>
+            <a:pPr algn="ctr"/>
+            <a:endParaRPr lang="en-US"/>
+          </a:p>
+        </p:txBody>
+      </p:sp>
+      <p:sp>
+        <p:nvSpPr>
+          <p:cNvPr id="7" name="Title 6">
+            <a:extLst>
+              <a:ext uri="{FF2B5EF4-FFF2-40B4-BE49-F238E27FC236}">
+                <a16:creationId xmlns:a16="http://schemas.microsoft.com/office/drawing/2014/main" id="{B779B904-91EE-C340-9246-47E40D3AFC74}"/>
               </a:ext>
             </a:extLst>
           </p:cNvPr>
@@ -5050,87 +6264,19 @@
             <p:ph type="title"/>
           </p:nvPr>
         </p:nvSpPr>
-        <p:spPr/>
+        <p:spPr>
+          <a:xfrm>
+            <a:off x="838200" y="365125"/>
+            <a:ext cx="6934200" cy="1325563"/>
+          </a:xfrm>
+        </p:spPr>
         <p:txBody>
           <a:bodyPr/>
           <a:lstStyle/>
           <a:p>
             <a:r>
               <a:rPr lang="en-US" dirty="0"/>
-              <a:t>Making comments</a:t>
-            </a:r>
-          </a:p>
-        </p:txBody>
-      </p:sp>
-      <p:sp>
-        <p:nvSpPr>
-          <p:cNvPr id="3" name="Content Placeholder 2">
-            <a:extLst>
-              <a:ext uri="{FF2B5EF4-FFF2-40B4-BE49-F238E27FC236}">
-                <a16:creationId xmlns:a16="http://schemas.microsoft.com/office/drawing/2014/main" id="{C7155575-208A-914C-8664-E074A5756141}"/>
-              </a:ext>
-            </a:extLst>
-          </p:cNvPr>
-          <p:cNvSpPr>
-            <a:spLocks noGrp="1"/>
-          </p:cNvSpPr>
-          <p:nvPr>
-            <p:ph idx="1"/>
-          </p:nvPr>
-        </p:nvSpPr>
-        <p:spPr/>
-        <p:txBody>
-          <a:bodyPr/>
-          <a:lstStyle/>
-          <a:p>
-            <a:r>
-              <a:rPr lang="en-US" dirty="0"/>
-              <a:t>Anyone can make a comment</a:t>
-            </a:r>
-          </a:p>
-          <a:p>
-            <a:r>
-              <a:rPr lang="en-US" dirty="0"/>
-              <a:t>Should be logged in (optional)</a:t>
-            </a:r>
-          </a:p>
-          <a:p>
-            <a:r>
-              <a:rPr lang="en-US" dirty="0"/>
-              <a:t>Can be for the whole model or an element</a:t>
-            </a:r>
-          </a:p>
-          <a:p>
-            <a:r>
-              <a:rPr lang="en-US" dirty="0"/>
-              <a:t>Can make notes about someone else's comment</a:t>
-            </a:r>
-          </a:p>
-          <a:p>
-            <a:r>
-              <a:rPr lang="en-US" dirty="0"/>
-              <a:t>Possibilities</a:t>
-            </a:r>
-          </a:p>
-          <a:p>
-            <a:pPr lvl="1"/>
-            <a:r>
-              <a:rPr lang="en-US" dirty="0"/>
-              <a:t>Suggest new name</a:t>
-            </a:r>
-          </a:p>
-          <a:p>
-            <a:pPr lvl="1"/>
-            <a:r>
-              <a:rPr lang="en-US" dirty="0"/>
-              <a:t>Update to element description or cardinality</a:t>
-            </a:r>
-          </a:p>
-          <a:p>
-            <a:pPr lvl="1"/>
-            <a:r>
-              <a:rPr lang="en-US" dirty="0"/>
-              <a:t>Comment on </a:t>
+              <a:t>View Details of a </a:t>
             </a:r>
             <a:r>
               <a:rPr lang="en-US" dirty="0" err="1"/>
@@ -5140,10 +6286,86 @@
           </a:p>
         </p:txBody>
       </p:sp>
+      <p:sp>
+        <p:nvSpPr>
+          <p:cNvPr id="9" name="TextBox 8">
+            <a:extLst>
+              <a:ext uri="{FF2B5EF4-FFF2-40B4-BE49-F238E27FC236}">
+                <a16:creationId xmlns:a16="http://schemas.microsoft.com/office/drawing/2014/main" id="{02C56FD8-4BCD-D44B-B9BC-0CBFA2F6DC45}"/>
+              </a:ext>
+            </a:extLst>
+          </p:cNvPr>
+          <p:cNvSpPr txBox="1"/>
+          <p:nvPr/>
+        </p:nvSpPr>
+        <p:spPr>
+          <a:xfrm>
+            <a:off x="9094573" y="729049"/>
+            <a:ext cx="1739387" cy="369332"/>
+          </a:xfrm>
+          <a:prstGeom prst="rect">
+            <a:avLst/>
+          </a:prstGeom>
+          <a:noFill/>
+        </p:spPr>
+        <p:txBody>
+          <a:bodyPr wrap="none" rtlCol="0">
+            <a:spAutoFit/>
+          </a:bodyPr>
+          <a:lstStyle/>
+          <a:p>
+            <a:r>
+              <a:rPr lang="en-US" dirty="0"/>
+              <a:t>Click link to view</a:t>
+            </a:r>
+          </a:p>
+        </p:txBody>
+      </p:sp>
+      <p:cxnSp>
+        <p:nvCxnSpPr>
+          <p:cNvPr id="11" name="Straight Arrow Connector 10">
+            <a:extLst>
+              <a:ext uri="{FF2B5EF4-FFF2-40B4-BE49-F238E27FC236}">
+                <a16:creationId xmlns:a16="http://schemas.microsoft.com/office/drawing/2014/main" id="{525F4EF7-0744-564A-986D-48DA07C26558}"/>
+              </a:ext>
+            </a:extLst>
+          </p:cNvPr>
+          <p:cNvCxnSpPr>
+            <a:stCxn id="9" idx="2"/>
+          </p:cNvCxnSpPr>
+          <p:nvPr/>
+        </p:nvCxnSpPr>
+        <p:spPr>
+          <a:xfrm flipH="1">
+            <a:off x="9428205" y="1098381"/>
+            <a:ext cx="536062" cy="3739890"/>
+          </a:xfrm>
+          <a:prstGeom prst="straightConnector1">
+            <a:avLst/>
+          </a:prstGeom>
+          <a:ln>
+            <a:tailEnd type="triangle"/>
+          </a:ln>
+        </p:spPr>
+        <p:style>
+          <a:lnRef idx="1">
+            <a:schemeClr val="accent1"/>
+          </a:lnRef>
+          <a:fillRef idx="0">
+            <a:schemeClr val="accent1"/>
+          </a:fillRef>
+          <a:effectRef idx="0">
+            <a:schemeClr val="accent1"/>
+          </a:effectRef>
+          <a:fontRef idx="minor">
+            <a:schemeClr val="tx1"/>
+          </a:fontRef>
+        </p:style>
+      </p:cxnSp>
     </p:spTree>
     <p:extLst>
       <p:ext uri="{BB962C8B-B14F-4D97-AF65-F5344CB8AC3E}">
-        <p14:creationId xmlns:p14="http://schemas.microsoft.com/office/powerpoint/2010/main" val="945957552"/>
+        <p14:creationId xmlns:p14="http://schemas.microsoft.com/office/powerpoint/2010/main" val="3403951051"/>
       </p:ext>
     </p:extLst>
   </p:cSld>
@@ -5172,10 +6394,10 @@
       </p:grpSpPr>
       <p:sp>
         <p:nvSpPr>
-          <p:cNvPr id="2" name="Title 1">
-            <a:extLst>
-              <a:ext uri="{FF2B5EF4-FFF2-40B4-BE49-F238E27FC236}">
-                <a16:creationId xmlns:a16="http://schemas.microsoft.com/office/drawing/2014/main" id="{D7DEC8A6-F787-FB43-A6E7-D9B4B97973B3}"/>
+          <p:cNvPr id="4" name="Title 3">
+            <a:extLst>
+              <a:ext uri="{FF2B5EF4-FFF2-40B4-BE49-F238E27FC236}">
+                <a16:creationId xmlns:a16="http://schemas.microsoft.com/office/drawing/2014/main" id="{1EEF286D-5AFE-A34F-8DEF-B201DBE2929D}"/>
               </a:ext>
             </a:extLst>
           </p:cNvPr>
@@ -5186,29 +6408,28 @@
             <p:ph type="title"/>
           </p:nvPr>
         </p:nvSpPr>
-        <p:spPr>
-          <a:xfrm>
-            <a:off x="838200" y="365125"/>
-            <a:ext cx="4672914" cy="1325563"/>
-          </a:xfrm>
-        </p:spPr>
+        <p:spPr/>
         <p:txBody>
           <a:bodyPr/>
           <a:lstStyle/>
           <a:p>
             <a:r>
+              <a:rPr lang="en-US" dirty="0" err="1"/>
+              <a:t>ValueSet</a:t>
+            </a:r>
+            <a:r>
               <a:rPr lang="en-US" dirty="0"/>
-              <a:t>Comments</a:t>
+              <a:t> browser</a:t>
             </a:r>
           </a:p>
         </p:txBody>
       </p:sp>
       <p:pic>
         <p:nvPicPr>
-          <p:cNvPr id="4" name="Picture 3">
-            <a:extLst>
-              <a:ext uri="{FF2B5EF4-FFF2-40B4-BE49-F238E27FC236}">
-                <a16:creationId xmlns:a16="http://schemas.microsoft.com/office/drawing/2014/main" id="{839C2C5B-B33C-D148-A78A-2F8B1ACDE079}"/>
+          <p:cNvPr id="6" name="Picture 5">
+            <a:extLst>
+              <a:ext uri="{FF2B5EF4-FFF2-40B4-BE49-F238E27FC236}">
+                <a16:creationId xmlns:a16="http://schemas.microsoft.com/office/drawing/2014/main" id="{55B7643C-BF5A-5C4E-8AC4-03C81ADCDB26}"/>
               </a:ext>
             </a:extLst>
           </p:cNvPr>
@@ -5225,8 +6446,8 @@
         </p:blipFill>
         <p:spPr>
           <a:xfrm>
-            <a:off x="0" y="1523894"/>
-            <a:ext cx="12192000" cy="4675183"/>
+            <a:off x="3446505" y="1904258"/>
+            <a:ext cx="7907295" cy="4256272"/>
           </a:xfrm>
           <a:prstGeom prst="rect">
             <a:avLst/>
@@ -5235,93 +6456,10 @@
       </p:pic>
       <p:sp>
         <p:nvSpPr>
-          <p:cNvPr id="5" name="TextBox 4">
-            <a:extLst>
-              <a:ext uri="{FF2B5EF4-FFF2-40B4-BE49-F238E27FC236}">
-                <a16:creationId xmlns:a16="http://schemas.microsoft.com/office/drawing/2014/main" id="{3289B97E-7B98-144C-919B-6FE7EBCDF5AF}"/>
-              </a:ext>
-            </a:extLst>
-          </p:cNvPr>
-          <p:cNvSpPr txBox="1"/>
-          <p:nvPr/>
-        </p:nvSpPr>
-        <p:spPr>
-          <a:xfrm>
-            <a:off x="3645243" y="2990336"/>
-            <a:ext cx="2130327" cy="646331"/>
-          </a:xfrm>
-          <a:prstGeom prst="rect">
-            <a:avLst/>
-          </a:prstGeom>
-          <a:noFill/>
-        </p:spPr>
-        <p:txBody>
-          <a:bodyPr wrap="none" rtlCol="0">
-            <a:spAutoFit/>
-          </a:bodyPr>
-          <a:lstStyle/>
-          <a:p>
-            <a:r>
-              <a:rPr lang="en-US" dirty="0"/>
-              <a:t>Add a new comment</a:t>
-            </a:r>
-          </a:p>
-          <a:p>
-            <a:r>
-              <a:rPr lang="en-US" dirty="0"/>
-              <a:t>(Logged in user only)</a:t>
-            </a:r>
-          </a:p>
-        </p:txBody>
-      </p:sp>
-      <p:cxnSp>
-        <p:nvCxnSpPr>
-          <p:cNvPr id="7" name="Straight Arrow Connector 6">
-            <a:extLst>
-              <a:ext uri="{FF2B5EF4-FFF2-40B4-BE49-F238E27FC236}">
-                <a16:creationId xmlns:a16="http://schemas.microsoft.com/office/drawing/2014/main" id="{A547306F-DF55-FA49-A7E9-006CD7FA3009}"/>
-              </a:ext>
-            </a:extLst>
-          </p:cNvPr>
-          <p:cNvCxnSpPr/>
-          <p:nvPr/>
-        </p:nvCxnSpPr>
-        <p:spPr>
-          <a:xfrm>
-            <a:off x="5782962" y="3126259"/>
-            <a:ext cx="5461687" cy="1779373"/>
-          </a:xfrm>
-          <a:prstGeom prst="straightConnector1">
-            <a:avLst/>
-          </a:prstGeom>
-          <a:ln>
-            <a:solidFill>
-              <a:srgbClr val="FF0000"/>
-            </a:solidFill>
-            <a:tailEnd type="triangle"/>
-          </a:ln>
-        </p:spPr>
-        <p:style>
-          <a:lnRef idx="1">
-            <a:schemeClr val="accent1"/>
-          </a:lnRef>
-          <a:fillRef idx="0">
-            <a:schemeClr val="accent1"/>
-          </a:fillRef>
-          <a:effectRef idx="0">
-            <a:schemeClr val="accent1"/>
-          </a:effectRef>
-          <a:fontRef idx="minor">
-            <a:schemeClr val="tx1"/>
-          </a:fontRef>
-        </p:style>
-      </p:cxnSp>
-      <p:sp>
-        <p:nvSpPr>
-          <p:cNvPr id="8" name="Oval 7">
-            <a:extLst>
-              <a:ext uri="{FF2B5EF4-FFF2-40B4-BE49-F238E27FC236}">
-                <a16:creationId xmlns:a16="http://schemas.microsoft.com/office/drawing/2014/main" id="{A2640E01-7C27-C342-8BA9-F436889BF5C7}"/>
+          <p:cNvPr id="7" name="Oval 6">
+            <a:extLst>
+              <a:ext uri="{FF2B5EF4-FFF2-40B4-BE49-F238E27FC236}">
+                <a16:creationId xmlns:a16="http://schemas.microsoft.com/office/drawing/2014/main" id="{8C0C0C30-8FAB-BC42-9341-CCCBF865FAB7}"/>
               </a:ext>
             </a:extLst>
           </p:cNvPr>
@@ -5330,8 +6468,8 @@
         </p:nvSpPr>
         <p:spPr>
           <a:xfrm>
-            <a:off x="11244649" y="4745353"/>
-            <a:ext cx="1085335" cy="320557"/>
+            <a:off x="4705310" y="3021828"/>
+            <a:ext cx="2027063" cy="585627"/>
           </a:xfrm>
           <a:prstGeom prst="ellipse">
             <a:avLst/>
@@ -5370,10 +6508,10 @@
       </p:sp>
       <p:sp>
         <p:nvSpPr>
-          <p:cNvPr id="9" name="TextBox 8">
-            <a:extLst>
-              <a:ext uri="{FF2B5EF4-FFF2-40B4-BE49-F238E27FC236}">
-                <a16:creationId xmlns:a16="http://schemas.microsoft.com/office/drawing/2014/main" id="{C60B4ADD-DD40-2445-B9F6-897D3D88CEAA}"/>
+          <p:cNvPr id="8" name="TextBox 7">
+            <a:extLst>
+              <a:ext uri="{FF2B5EF4-FFF2-40B4-BE49-F238E27FC236}">
+                <a16:creationId xmlns:a16="http://schemas.microsoft.com/office/drawing/2014/main" id="{E40F1ACE-D77C-5140-95DF-AD0D6506242C}"/>
               </a:ext>
             </a:extLst>
           </p:cNvPr>
@@ -5382,8 +6520,8 @@
         </p:nvSpPr>
         <p:spPr>
           <a:xfrm>
-            <a:off x="3113904" y="5229189"/>
-            <a:ext cx="3211986" cy="923330"/>
+            <a:off x="691979" y="3238123"/>
+            <a:ext cx="2332498" cy="369332"/>
           </a:xfrm>
           <a:prstGeom prst="rect">
             <a:avLst/>
@@ -5391,36 +6529,68 @@
           <a:noFill/>
         </p:spPr>
         <p:txBody>
-          <a:bodyPr wrap="square" rtlCol="0">
+          <a:bodyPr wrap="none" rtlCol="0">
             <a:spAutoFit/>
           </a:bodyPr>
           <a:lstStyle/>
           <a:p>
             <a:r>
               <a:rPr lang="en-US" dirty="0"/>
-              <a:t>Edit comment</a:t>
-            </a:r>
-          </a:p>
-          <a:p>
-            <a:r>
-              <a:rPr lang="en-US" dirty="0"/>
-              <a:t>(Anyone can view) </a:t>
-            </a:r>
-          </a:p>
-          <a:p>
-            <a:r>
-              <a:rPr lang="en-US" dirty="0"/>
-              <a:t>Add a note – logged in user</a:t>
-            </a:r>
-          </a:p>
-        </p:txBody>
-      </p:sp>
-      <p:sp>
-        <p:nvSpPr>
-          <p:cNvPr id="10" name="Oval 9">
-            <a:extLst>
-              <a:ext uri="{FF2B5EF4-FFF2-40B4-BE49-F238E27FC236}">
-                <a16:creationId xmlns:a16="http://schemas.microsoft.com/office/drawing/2014/main" id="{EDA89960-36FD-F146-A556-CE06651ABA62}"/>
+              <a:t>Filter by concept name</a:t>
+            </a:r>
+          </a:p>
+        </p:txBody>
+      </p:sp>
+      <p:cxnSp>
+        <p:nvCxnSpPr>
+          <p:cNvPr id="10" name="Straight Arrow Connector 9">
+            <a:extLst>
+              <a:ext uri="{FF2B5EF4-FFF2-40B4-BE49-F238E27FC236}">
+                <a16:creationId xmlns:a16="http://schemas.microsoft.com/office/drawing/2014/main" id="{72834669-9CAE-F548-B39D-DB8169295ABF}"/>
+              </a:ext>
+            </a:extLst>
+          </p:cNvPr>
+          <p:cNvCxnSpPr>
+            <a:stCxn id="8" idx="3"/>
+          </p:cNvCxnSpPr>
+          <p:nvPr/>
+        </p:nvCxnSpPr>
+        <p:spPr>
+          <a:xfrm flipV="1">
+            <a:off x="3024477" y="3314641"/>
+            <a:ext cx="1680833" cy="108148"/>
+          </a:xfrm>
+          <a:prstGeom prst="straightConnector1">
+            <a:avLst/>
+          </a:prstGeom>
+          <a:ln w="22225">
+            <a:solidFill>
+              <a:srgbClr val="FF0000"/>
+            </a:solidFill>
+            <a:tailEnd type="triangle"/>
+          </a:ln>
+        </p:spPr>
+        <p:style>
+          <a:lnRef idx="1">
+            <a:schemeClr val="accent1"/>
+          </a:lnRef>
+          <a:fillRef idx="0">
+            <a:schemeClr val="accent1"/>
+          </a:fillRef>
+          <a:effectRef idx="0">
+            <a:schemeClr val="accent1"/>
+          </a:effectRef>
+          <a:fontRef idx="minor">
+            <a:schemeClr val="tx1"/>
+          </a:fontRef>
+        </p:style>
+      </p:cxnSp>
+      <p:sp>
+        <p:nvSpPr>
+          <p:cNvPr id="11" name="Oval 10">
+            <a:extLst>
+              <a:ext uri="{FF2B5EF4-FFF2-40B4-BE49-F238E27FC236}">
+                <a16:creationId xmlns:a16="http://schemas.microsoft.com/office/drawing/2014/main" id="{7442DF2A-5E3D-2343-969D-E8B988111052}"/>
               </a:ext>
             </a:extLst>
           </p:cNvPr>
@@ -5429,8 +6599,8 @@
         </p:nvSpPr>
         <p:spPr>
           <a:xfrm>
-            <a:off x="11615351" y="5065910"/>
-            <a:ext cx="615778" cy="308201"/>
+            <a:off x="9885405" y="3021828"/>
+            <a:ext cx="1208903" cy="585627"/>
           </a:xfrm>
           <a:prstGeom prst="ellipse">
             <a:avLst/>
@@ -5467,27 +6637,64 @@
           </a:p>
         </p:txBody>
       </p:sp>
+      <p:sp>
+        <p:nvSpPr>
+          <p:cNvPr id="12" name="TextBox 11">
+            <a:extLst>
+              <a:ext uri="{FF2B5EF4-FFF2-40B4-BE49-F238E27FC236}">
+                <a16:creationId xmlns:a16="http://schemas.microsoft.com/office/drawing/2014/main" id="{3D213F94-F7F2-D74D-8A1F-17ADD6D0E76B}"/>
+              </a:ext>
+            </a:extLst>
+          </p:cNvPr>
+          <p:cNvSpPr txBox="1"/>
+          <p:nvPr/>
+        </p:nvSpPr>
+        <p:spPr>
+          <a:xfrm>
+            <a:off x="8760941" y="1027906"/>
+            <a:ext cx="3170996" cy="369332"/>
+          </a:xfrm>
+          <a:prstGeom prst="rect">
+            <a:avLst/>
+          </a:prstGeom>
+          <a:noFill/>
+        </p:spPr>
+        <p:txBody>
+          <a:bodyPr wrap="none" rtlCol="0">
+            <a:spAutoFit/>
+          </a:bodyPr>
+          <a:lstStyle/>
+          <a:p>
+            <a:r>
+              <a:rPr lang="en-US" dirty="0"/>
+              <a:t>Click to view matching concepts</a:t>
+            </a:r>
+          </a:p>
+        </p:txBody>
+      </p:sp>
       <p:cxnSp>
         <p:nvCxnSpPr>
-          <p:cNvPr id="12" name="Straight Arrow Connector 11">
-            <a:extLst>
-              <a:ext uri="{FF2B5EF4-FFF2-40B4-BE49-F238E27FC236}">
-                <a16:creationId xmlns:a16="http://schemas.microsoft.com/office/drawing/2014/main" id="{1BD22FB9-C266-1F4E-A4F1-36C0A2CD2071}"/>
-              </a:ext>
-            </a:extLst>
-          </p:cNvPr>
-          <p:cNvCxnSpPr/>
+          <p:cNvPr id="14" name="Straight Arrow Connector 13">
+            <a:extLst>
+              <a:ext uri="{FF2B5EF4-FFF2-40B4-BE49-F238E27FC236}">
+                <a16:creationId xmlns:a16="http://schemas.microsoft.com/office/drawing/2014/main" id="{96C1D963-B095-294A-A827-6C23DC7C3C13}"/>
+              </a:ext>
+            </a:extLst>
+          </p:cNvPr>
+          <p:cNvCxnSpPr>
+            <a:stCxn id="12" idx="2"/>
+          </p:cNvCxnSpPr>
           <p:nvPr/>
         </p:nvCxnSpPr>
         <p:spPr>
-          <a:xfrm flipV="1">
-            <a:off x="5985475" y="5229189"/>
-            <a:ext cx="5654590" cy="318995"/>
+          <a:xfrm>
+            <a:off x="10346439" y="1397238"/>
+            <a:ext cx="143417" cy="1624590"/>
           </a:xfrm>
           <a:prstGeom prst="straightConnector1">
             <a:avLst/>
           </a:prstGeom>
-          <a:ln>
+          <a:ln w="25400">
             <a:solidFill>
               <a:srgbClr val="FF0000"/>
             </a:solidFill>
@@ -5512,7 +6719,7 @@
     </p:spTree>
     <p:extLst>
       <p:ext uri="{BB962C8B-B14F-4D97-AF65-F5344CB8AC3E}">
-        <p14:creationId xmlns:p14="http://schemas.microsoft.com/office/powerpoint/2010/main" val="1545622574"/>
+        <p14:creationId xmlns:p14="http://schemas.microsoft.com/office/powerpoint/2010/main" val="2449245863"/>
       </p:ext>
     </p:extLst>
   </p:cSld>
@@ -5544,7 +6751,7 @@
           <p:cNvPr id="2" name="Title 1">
             <a:extLst>
               <a:ext uri="{FF2B5EF4-FFF2-40B4-BE49-F238E27FC236}">
-                <a16:creationId xmlns:a16="http://schemas.microsoft.com/office/drawing/2014/main" id="{B012B7B1-A870-5C40-B2E6-8992756D3752}"/>
+                <a16:creationId xmlns:a16="http://schemas.microsoft.com/office/drawing/2014/main" id="{D7C244DA-7206-C342-A789-040821F18829}"/>
               </a:ext>
             </a:extLst>
           </p:cNvPr>
@@ -5562,446 +6769,109 @@
           <a:p>
             <a:r>
               <a:rPr lang="en-US" dirty="0"/>
-              <a:t>Comment details and notes</a:t>
-            </a:r>
-          </a:p>
-        </p:txBody>
-      </p:sp>
-      <p:pic>
-        <p:nvPicPr>
-          <p:cNvPr id="4" name="Picture 3">
-            <a:extLst>
-              <a:ext uri="{FF2B5EF4-FFF2-40B4-BE49-F238E27FC236}">
-                <a16:creationId xmlns:a16="http://schemas.microsoft.com/office/drawing/2014/main" id="{C944E600-9756-9044-80FF-47700D35B668}"/>
-              </a:ext>
-            </a:extLst>
-          </p:cNvPr>
-          <p:cNvPicPr>
-            <a:picLocks noChangeAspect="1"/>
-          </p:cNvPicPr>
-          <p:nvPr/>
-        </p:nvPicPr>
-        <p:blipFill>
-          <a:blip r:embed="rId2"/>
-          <a:stretch>
-            <a:fillRect/>
-          </a:stretch>
-        </p:blipFill>
-        <p:spPr>
-          <a:xfrm>
-            <a:off x="838200" y="1690688"/>
-            <a:ext cx="10299700" cy="4838700"/>
-          </a:xfrm>
-          <a:prstGeom prst="rect">
-            <a:avLst/>
-          </a:prstGeom>
-        </p:spPr>
-      </p:pic>
-      <p:sp>
-        <p:nvSpPr>
-          <p:cNvPr id="5" name="Oval 4">
-            <a:extLst>
-              <a:ext uri="{FF2B5EF4-FFF2-40B4-BE49-F238E27FC236}">
-                <a16:creationId xmlns:a16="http://schemas.microsoft.com/office/drawing/2014/main" id="{773CAB60-7A1F-A34D-9D2D-BBFEFFBC26A6}"/>
-              </a:ext>
-            </a:extLst>
-          </p:cNvPr>
-          <p:cNvSpPr/>
-          <p:nvPr/>
-        </p:nvSpPr>
-        <p:spPr>
-          <a:xfrm flipV="1">
-            <a:off x="392802" y="2542585"/>
-            <a:ext cx="3215371" cy="2573112"/>
-          </a:xfrm>
-          <a:prstGeom prst="ellipse">
-            <a:avLst/>
-          </a:prstGeom>
-          <a:noFill/>
-          <a:ln>
-            <a:solidFill>
-              <a:srgbClr val="FF0000"/>
-            </a:solidFill>
-          </a:ln>
-        </p:spPr>
-        <p:style>
-          <a:lnRef idx="2">
-            <a:schemeClr val="accent1">
-              <a:shade val="50000"/>
-            </a:schemeClr>
-          </a:lnRef>
-          <a:fillRef idx="1">
-            <a:schemeClr val="accent1"/>
-          </a:fillRef>
-          <a:effectRef idx="0">
-            <a:schemeClr val="accent1"/>
-          </a:effectRef>
-          <a:fontRef idx="minor">
-            <a:schemeClr val="lt1"/>
-          </a:fontRef>
-        </p:style>
-        <p:txBody>
-          <a:bodyPr rtlCol="0" anchor="ctr"/>
-          <a:lstStyle/>
-          <a:p>
-            <a:pPr algn="ctr"/>
-            <a:endParaRPr lang="en-US"/>
-          </a:p>
-        </p:txBody>
-      </p:sp>
-      <p:sp>
-        <p:nvSpPr>
-          <p:cNvPr id="6" name="Oval 5">
-            <a:extLst>
-              <a:ext uri="{FF2B5EF4-FFF2-40B4-BE49-F238E27FC236}">
-                <a16:creationId xmlns:a16="http://schemas.microsoft.com/office/drawing/2014/main" id="{811D4C7F-53B7-F14D-B25C-44CC23211E93}"/>
-              </a:ext>
-            </a:extLst>
-          </p:cNvPr>
-          <p:cNvSpPr/>
-          <p:nvPr/>
-        </p:nvSpPr>
-        <p:spPr>
-          <a:xfrm>
-            <a:off x="4198683" y="3176592"/>
-            <a:ext cx="6415771" cy="1494262"/>
-          </a:xfrm>
-          <a:prstGeom prst="ellipse">
-            <a:avLst/>
-          </a:prstGeom>
-          <a:noFill/>
-          <a:ln>
-            <a:solidFill>
-              <a:srgbClr val="FF0000"/>
-            </a:solidFill>
-          </a:ln>
-        </p:spPr>
-        <p:style>
-          <a:lnRef idx="2">
-            <a:schemeClr val="accent1">
-              <a:shade val="50000"/>
-            </a:schemeClr>
-          </a:lnRef>
-          <a:fillRef idx="1">
-            <a:schemeClr val="accent1"/>
-          </a:fillRef>
-          <a:effectRef idx="0">
-            <a:schemeClr val="accent1"/>
-          </a:effectRef>
-          <a:fontRef idx="minor">
-            <a:schemeClr val="lt1"/>
-          </a:fontRef>
-        </p:style>
-        <p:txBody>
-          <a:bodyPr rtlCol="0" anchor="ctr"/>
-          <a:lstStyle/>
-          <a:p>
-            <a:pPr algn="ctr"/>
-            <a:endParaRPr lang="en-US"/>
-          </a:p>
-        </p:txBody>
-      </p:sp>
-      <p:sp>
-        <p:nvSpPr>
-          <p:cNvPr id="7" name="Oval 6">
-            <a:extLst>
-              <a:ext uri="{FF2B5EF4-FFF2-40B4-BE49-F238E27FC236}">
-                <a16:creationId xmlns:a16="http://schemas.microsoft.com/office/drawing/2014/main" id="{B1F9074B-E529-8A45-AFB2-D8169716EFA7}"/>
-              </a:ext>
-            </a:extLst>
-          </p:cNvPr>
-          <p:cNvSpPr/>
-          <p:nvPr/>
-        </p:nvSpPr>
-        <p:spPr>
-          <a:xfrm>
-            <a:off x="9326737" y="5014493"/>
-            <a:ext cx="2027063" cy="585627"/>
-          </a:xfrm>
-          <a:prstGeom prst="ellipse">
-            <a:avLst/>
-          </a:prstGeom>
-          <a:noFill/>
-          <a:ln>
-            <a:solidFill>
-              <a:srgbClr val="FF0000"/>
-            </a:solidFill>
-          </a:ln>
-        </p:spPr>
-        <p:style>
-          <a:lnRef idx="2">
-            <a:schemeClr val="accent1">
-              <a:shade val="50000"/>
-            </a:schemeClr>
-          </a:lnRef>
-          <a:fillRef idx="1">
-            <a:schemeClr val="accent1"/>
-          </a:fillRef>
-          <a:effectRef idx="0">
-            <a:schemeClr val="accent1"/>
-          </a:effectRef>
-          <a:fontRef idx="minor">
-            <a:schemeClr val="lt1"/>
-          </a:fontRef>
-        </p:style>
-        <p:txBody>
-          <a:bodyPr rtlCol="0" anchor="ctr"/>
-          <a:lstStyle/>
-          <a:p>
-            <a:pPr algn="ctr"/>
-            <a:endParaRPr lang="en-US"/>
-          </a:p>
-        </p:txBody>
-      </p:sp>
-      <p:sp>
-        <p:nvSpPr>
-          <p:cNvPr id="8" name="TextBox 7">
-            <a:extLst>
-              <a:ext uri="{FF2B5EF4-FFF2-40B4-BE49-F238E27FC236}">
-                <a16:creationId xmlns:a16="http://schemas.microsoft.com/office/drawing/2014/main" id="{EB1E2E4D-DE7C-5448-94F2-DEE9D37F5DE2}"/>
-              </a:ext>
-            </a:extLst>
-          </p:cNvPr>
-          <p:cNvSpPr txBox="1"/>
-          <p:nvPr/>
-        </p:nvSpPr>
-        <p:spPr>
-          <a:xfrm>
-            <a:off x="5474043" y="1690688"/>
-            <a:ext cx="2018438" cy="369332"/>
-          </a:xfrm>
-          <a:prstGeom prst="rect">
-            <a:avLst/>
-          </a:prstGeom>
-          <a:noFill/>
-        </p:spPr>
-        <p:txBody>
-          <a:bodyPr wrap="none" rtlCol="0">
-            <a:spAutoFit/>
+              <a:t>Making comments</a:t>
+            </a:r>
+          </a:p>
+        </p:txBody>
+      </p:sp>
+      <p:sp>
+        <p:nvSpPr>
+          <p:cNvPr id="3" name="Content Placeholder 2">
+            <a:extLst>
+              <a:ext uri="{FF2B5EF4-FFF2-40B4-BE49-F238E27FC236}">
+                <a16:creationId xmlns:a16="http://schemas.microsoft.com/office/drawing/2014/main" id="{C7155575-208A-914C-8664-E074A5756141}"/>
+              </a:ext>
+            </a:extLst>
+          </p:cNvPr>
+          <p:cNvSpPr>
+            <a:spLocks noGrp="1"/>
+          </p:cNvSpPr>
+          <p:nvPr>
+            <p:ph idx="1"/>
+          </p:nvPr>
+        </p:nvSpPr>
+        <p:spPr/>
+        <p:txBody>
+          <a:bodyPr>
+            <a:normAutofit lnSpcReduction="10000"/>
           </a:bodyPr>
           <a:lstStyle/>
           <a:p>
             <a:r>
               <a:rPr lang="en-US" dirty="0"/>
-              <a:t>Details of comment</a:t>
-            </a:r>
-          </a:p>
-        </p:txBody>
-      </p:sp>
-      <p:cxnSp>
-        <p:nvCxnSpPr>
-          <p:cNvPr id="10" name="Straight Arrow Connector 9">
-            <a:extLst>
-              <a:ext uri="{FF2B5EF4-FFF2-40B4-BE49-F238E27FC236}">
-                <a16:creationId xmlns:a16="http://schemas.microsoft.com/office/drawing/2014/main" id="{F0C0DF53-CBE7-244C-A410-E2ED85371A7D}"/>
-              </a:ext>
-            </a:extLst>
-          </p:cNvPr>
-          <p:cNvCxnSpPr>
-            <a:stCxn id="8" idx="1"/>
-          </p:cNvCxnSpPr>
-          <p:nvPr/>
-        </p:nvCxnSpPr>
-        <p:spPr>
-          <a:xfrm flipH="1">
-            <a:off x="3398108" y="1875354"/>
-            <a:ext cx="2075935" cy="1301238"/>
-          </a:xfrm>
-          <a:prstGeom prst="straightConnector1">
-            <a:avLst/>
-          </a:prstGeom>
-          <a:ln>
-            <a:solidFill>
-              <a:srgbClr val="FF0000"/>
-            </a:solidFill>
-            <a:tailEnd type="triangle"/>
-          </a:ln>
-        </p:spPr>
-        <p:style>
-          <a:lnRef idx="1">
-            <a:schemeClr val="accent1"/>
-          </a:lnRef>
-          <a:fillRef idx="0">
-            <a:schemeClr val="accent1"/>
-          </a:fillRef>
-          <a:effectRef idx="0">
-            <a:schemeClr val="accent1"/>
-          </a:effectRef>
-          <a:fontRef idx="minor">
-            <a:schemeClr val="tx1"/>
-          </a:fontRef>
-        </p:style>
-      </p:cxnSp>
-      <p:sp>
-        <p:nvSpPr>
-          <p:cNvPr id="11" name="TextBox 10">
-            <a:extLst>
-              <a:ext uri="{FF2B5EF4-FFF2-40B4-BE49-F238E27FC236}">
-                <a16:creationId xmlns:a16="http://schemas.microsoft.com/office/drawing/2014/main" id="{AC501962-3193-414C-BA1B-3AC656A5AFA2}"/>
-              </a:ext>
-            </a:extLst>
-          </p:cNvPr>
-          <p:cNvSpPr txBox="1"/>
-          <p:nvPr/>
-        </p:nvSpPr>
-        <p:spPr>
-          <a:xfrm>
-            <a:off x="8773297" y="1128894"/>
-            <a:ext cx="2842958" cy="369332"/>
-          </a:xfrm>
-          <a:prstGeom prst="rect">
-            <a:avLst/>
-          </a:prstGeom>
-          <a:noFill/>
-        </p:spPr>
-        <p:txBody>
-          <a:bodyPr wrap="none" rtlCol="0">
-            <a:spAutoFit/>
-          </a:bodyPr>
-          <a:lstStyle/>
+              <a:t>Anyone can make a comment</a:t>
+            </a:r>
+          </a:p>
           <a:p>
             <a:r>
               <a:rPr lang="en-US" dirty="0"/>
-              <a:t>Notes that have been added</a:t>
-            </a:r>
-          </a:p>
-        </p:txBody>
-      </p:sp>
-      <p:cxnSp>
-        <p:nvCxnSpPr>
-          <p:cNvPr id="13" name="Straight Arrow Connector 12">
-            <a:extLst>
-              <a:ext uri="{FF2B5EF4-FFF2-40B4-BE49-F238E27FC236}">
-                <a16:creationId xmlns:a16="http://schemas.microsoft.com/office/drawing/2014/main" id="{3565A96F-C9BC-DF40-B965-8EDB8812FA73}"/>
-              </a:ext>
-            </a:extLst>
-          </p:cNvPr>
-          <p:cNvCxnSpPr>
-            <a:stCxn id="11" idx="2"/>
-            <a:endCxn id="6" idx="7"/>
-          </p:cNvCxnSpPr>
-          <p:nvPr/>
-        </p:nvCxnSpPr>
-        <p:spPr>
-          <a:xfrm flipH="1">
-            <a:off x="9674886" y="1498226"/>
-            <a:ext cx="519890" cy="1897196"/>
-          </a:xfrm>
-          <a:prstGeom prst="straightConnector1">
-            <a:avLst/>
-          </a:prstGeom>
-          <a:ln>
-            <a:solidFill>
-              <a:srgbClr val="FF0000"/>
-            </a:solidFill>
-            <a:tailEnd type="triangle"/>
-          </a:ln>
-        </p:spPr>
-        <p:style>
-          <a:lnRef idx="1">
-            <a:schemeClr val="accent1"/>
-          </a:lnRef>
-          <a:fillRef idx="0">
-            <a:schemeClr val="accent1"/>
-          </a:fillRef>
-          <a:effectRef idx="0">
-            <a:schemeClr val="accent1"/>
-          </a:effectRef>
-          <a:fontRef idx="minor">
-            <a:schemeClr val="tx1"/>
-          </a:fontRef>
-        </p:style>
-      </p:cxnSp>
-      <p:sp>
-        <p:nvSpPr>
-          <p:cNvPr id="14" name="TextBox 13">
-            <a:extLst>
-              <a:ext uri="{FF2B5EF4-FFF2-40B4-BE49-F238E27FC236}">
-                <a16:creationId xmlns:a16="http://schemas.microsoft.com/office/drawing/2014/main" id="{801BCA21-2383-BD4F-87F4-8D45698F338D}"/>
-              </a:ext>
-            </a:extLst>
-          </p:cNvPr>
-          <p:cNvSpPr txBox="1"/>
-          <p:nvPr/>
-        </p:nvSpPr>
-        <p:spPr>
-          <a:xfrm>
-            <a:off x="5214551" y="5787426"/>
-            <a:ext cx="2142125" cy="646331"/>
-          </a:xfrm>
-          <a:prstGeom prst="rect">
-            <a:avLst/>
-          </a:prstGeom>
-          <a:noFill/>
-        </p:spPr>
-        <p:txBody>
-          <a:bodyPr wrap="none" rtlCol="0">
-            <a:spAutoFit/>
-          </a:bodyPr>
-          <a:lstStyle/>
-          <a:p>
+              <a:t>Must be logged in </a:t>
+            </a:r>
+          </a:p>
+          <a:p>
+            <a:pPr lvl="1"/>
             <a:r>
               <a:rPr lang="en-US" dirty="0"/>
-              <a:t>Add a new note</a:t>
+              <a:t>Otherwise view only</a:t>
             </a:r>
           </a:p>
           <a:p>
             <a:r>
               <a:rPr lang="en-US" dirty="0"/>
-              <a:t>(Logged in user only)</a:t>
-            </a:r>
-          </a:p>
-        </p:txBody>
-      </p:sp>
-      <p:cxnSp>
-        <p:nvCxnSpPr>
-          <p:cNvPr id="16" name="Straight Arrow Connector 15">
-            <a:extLst>
-              <a:ext uri="{FF2B5EF4-FFF2-40B4-BE49-F238E27FC236}">
-                <a16:creationId xmlns:a16="http://schemas.microsoft.com/office/drawing/2014/main" id="{34AB55B4-4A7D-874F-B19B-34C3C0D1B8E4}"/>
-              </a:ext>
-            </a:extLst>
-          </p:cNvPr>
-          <p:cNvCxnSpPr>
-            <a:stCxn id="14" idx="3"/>
-            <a:endCxn id="7" idx="2"/>
-          </p:cNvCxnSpPr>
-          <p:nvPr/>
-        </p:nvCxnSpPr>
-        <p:spPr>
-          <a:xfrm flipV="1">
-            <a:off x="7356676" y="5307307"/>
-            <a:ext cx="1970061" cy="803285"/>
-          </a:xfrm>
-          <a:prstGeom prst="straightConnector1">
-            <a:avLst/>
-          </a:prstGeom>
-          <a:ln>
-            <a:solidFill>
-              <a:srgbClr val="FF0000"/>
-            </a:solidFill>
-            <a:tailEnd type="triangle"/>
-          </a:ln>
-        </p:spPr>
-        <p:style>
-          <a:lnRef idx="1">
-            <a:schemeClr val="accent1"/>
-          </a:lnRef>
-          <a:fillRef idx="0">
-            <a:schemeClr val="accent1"/>
-          </a:fillRef>
-          <a:effectRef idx="0">
-            <a:schemeClr val="accent1"/>
-          </a:effectRef>
-          <a:fontRef idx="minor">
-            <a:schemeClr val="tx1"/>
-          </a:fontRef>
-        </p:style>
-      </p:cxnSp>
+              <a:t>Can be for the whole model or an element</a:t>
+            </a:r>
+          </a:p>
+          <a:p>
+            <a:r>
+              <a:rPr lang="en-US" dirty="0"/>
+              <a:t>Can make notes about someone else's comment</a:t>
+            </a:r>
+          </a:p>
+          <a:p>
+            <a:r>
+              <a:rPr lang="en-US" dirty="0"/>
+              <a:t>Possibilities</a:t>
+            </a:r>
+          </a:p>
+          <a:p>
+            <a:pPr lvl="1"/>
+            <a:r>
+              <a:rPr lang="en-US" dirty="0"/>
+              <a:t>Suggest new name</a:t>
+            </a:r>
+          </a:p>
+          <a:p>
+            <a:pPr lvl="1"/>
+            <a:r>
+              <a:rPr lang="en-US" dirty="0"/>
+              <a:t>Update to element description or cardinality</a:t>
+            </a:r>
+          </a:p>
+          <a:p>
+            <a:pPr lvl="1"/>
+            <a:r>
+              <a:rPr lang="en-US" dirty="0"/>
+              <a:t>Suggest it not be included</a:t>
+            </a:r>
+          </a:p>
+          <a:p>
+            <a:pPr lvl="1"/>
+            <a:r>
+              <a:rPr lang="en-US" dirty="0"/>
+              <a:t>Comment on </a:t>
+            </a:r>
+            <a:r>
+              <a:rPr lang="en-US" dirty="0" err="1"/>
+              <a:t>ValueSet</a:t>
+            </a:r>
+            <a:endParaRPr lang="en-US" dirty="0"/>
+          </a:p>
+        </p:txBody>
+      </p:sp>
     </p:spTree>
     <p:extLst>
       <p:ext uri="{BB962C8B-B14F-4D97-AF65-F5344CB8AC3E}">
-        <p14:creationId xmlns:p14="http://schemas.microsoft.com/office/powerpoint/2010/main" val="882927970"/>
+        <p14:creationId xmlns:p14="http://schemas.microsoft.com/office/powerpoint/2010/main" val="945957552"/>
       </p:ext>
     </p:extLst>
   </p:cSld>

</xml_diff>